<commit_message>
update dates and contact info
</commit_message>
<xml_diff>
--- a/slides/week-1.pptx
+++ b/slides/week-1.pptx
@@ -273,7 +273,7 @@
           <a:p>
             <a:fld id="{10EF4B4F-E8F0-422E-81BC-F48279DD1E61}" type="datetimeFigureOut">
               <a:rPr lang="en-US" smtClean="0"/>
-              <a:t>10/31/2017</a:t>
+              <a:t>1/11/18</a:t>
             </a:fld>
             <a:endParaRPr lang="en-US"/>
           </a:p>
@@ -747,7 +747,7 @@
           <a:p>
             <a:fld id="{1D8BD707-D9CF-40AE-B4C6-C98DA3205C09}" type="datetimeFigureOut">
               <a:rPr lang="en-US"/>
-              <a:t>10/31/2017</a:t>
+              <a:t>1/11/18</a:t>
             </a:fld>
             <a:endParaRPr lang="en-US"/>
           </a:p>
@@ -930,7 +930,7 @@
           <a:p>
             <a:fld id="{1D8BD707-D9CF-40AE-B4C6-C98DA3205C09}" type="datetimeFigureOut">
               <a:rPr lang="en-US"/>
-              <a:t>10/31/2017</a:t>
+              <a:t>1/11/18</a:t>
             </a:fld>
             <a:endParaRPr lang="en-US"/>
           </a:p>
@@ -1150,7 +1150,7 @@
           <a:p>
             <a:fld id="{1D8BD707-D9CF-40AE-B4C6-C98DA3205C09}" type="datetimeFigureOut">
               <a:rPr lang="en-US"/>
-              <a:t>10/31/2017</a:t>
+              <a:t>1/11/18</a:t>
             </a:fld>
             <a:endParaRPr lang="en-US"/>
           </a:p>
@@ -1304,7 +1304,7 @@
           <a:p>
             <a:fld id="{1D8BD707-D9CF-40AE-B4C6-C98DA3205C09}" type="datetimeFigureOut">
               <a:rPr lang="en-US"/>
-              <a:t>10/31/2017</a:t>
+              <a:t>1/11/18</a:t>
             </a:fld>
             <a:endParaRPr lang="en-US"/>
           </a:p>
@@ -1487,7 +1487,7 @@
           <a:p>
             <a:fld id="{1D8BD707-D9CF-40AE-B4C6-C98DA3205C09}" type="datetimeFigureOut">
               <a:rPr lang="en-US"/>
-              <a:t>10/31/2017</a:t>
+              <a:t>1/11/18</a:t>
             </a:fld>
             <a:endParaRPr lang="en-US"/>
           </a:p>
@@ -1718,7 +1718,7 @@
           <a:p>
             <a:fld id="{1D8BD707-D9CF-40AE-B4C6-C98DA3205C09}" type="datetimeFigureOut">
               <a:rPr lang="en-US"/>
-              <a:t>10/31/2017</a:t>
+              <a:t>1/11/18</a:t>
             </a:fld>
             <a:endParaRPr lang="en-US"/>
           </a:p>
@@ -2252,10 +2252,20 @@
                 <a:latin typeface="Georgia"/>
                 <a:cs typeface="Georgia"/>
               </a:rPr>
-              <a:t>Instructor: Beck Johnson  </a:t>
-            </a:r>
-            <a:r>
-              <a:rPr sz="2300" spc="-25" dirty="0">
+              <a:t>Instructor: </a:t>
+            </a:r>
+            <a:r>
+              <a:rPr lang="en-US" sz="2300" dirty="0" smtClean="0">
+                <a:solidFill>
+                  <a:srgbClr val="565B5F"/>
+                </a:solidFill>
+                <a:latin typeface="Georgia"/>
+                <a:cs typeface="Georgia"/>
+              </a:rPr>
+              <a:t>Aaron Bronow </a:t>
+            </a:r>
+            <a:r>
+              <a:rPr sz="2300" spc="-25" dirty="0" smtClean="0">
                 <a:solidFill>
                   <a:srgbClr val="565B5F"/>
                 </a:solidFill>
@@ -6731,7 +6741,7 @@
           <p:cNvPr id="6" name="Picture 5">
             <a:extLst>
               <a:ext uri="{FF2B5EF4-FFF2-40B4-BE49-F238E27FC236}">
-                <a16:creationId xmlns:a16="http://schemas.microsoft.com/office/drawing/2014/main" id="{B6C967B6-C6ED-4392-892C-1985F84EDA2C}"/>
+                <a16:creationId xmlns:a16="http://schemas.microsoft.com/office/drawing/2014/main" xmlns="" id="{B6C967B6-C6ED-4392-892C-1985F84EDA2C}"/>
               </a:ext>
             </a:extLst>
           </p:cNvPr>
@@ -13035,7 +13045,7 @@
         <p:spPr>
           <a:xfrm>
             <a:off x="1778000" y="3124200"/>
-            <a:ext cx="8507095" cy="5678478"/>
+            <a:ext cx="8507095" cy="5170646"/>
           </a:xfrm>
           <a:prstGeom prst="rect">
             <a:avLst/>
@@ -13105,6 +13115,116 @@
               </a:tabLst>
             </a:pPr>
             <a:r>
+              <a:rPr lang="en-US" sz="3300" dirty="0" smtClean="0">
+                <a:solidFill>
+                  <a:srgbClr val="5F5F5F"/>
+                </a:solidFill>
+                <a:latin typeface="Georgia"/>
+                <a:cs typeface="Georgia"/>
+              </a:rPr>
+              <a:t>Thursdays</a:t>
+            </a:r>
+            <a:r>
+              <a:rPr sz="3300" dirty="0" smtClean="0">
+                <a:solidFill>
+                  <a:srgbClr val="5F5F5F"/>
+                </a:solidFill>
+                <a:latin typeface="Georgia"/>
+                <a:cs typeface="Georgia"/>
+              </a:rPr>
+              <a:t> </a:t>
+            </a:r>
+            <a:r>
+              <a:rPr sz="3300" dirty="0">
+                <a:solidFill>
+                  <a:srgbClr val="5F5F5F"/>
+                </a:solidFill>
+                <a:latin typeface="Georgia"/>
+                <a:cs typeface="Georgia"/>
+              </a:rPr>
+              <a:t>from </a:t>
+            </a:r>
+            <a:r>
+              <a:rPr lang="en-US" sz="3300" spc="-5" dirty="0" smtClean="0">
+                <a:solidFill>
+                  <a:srgbClr val="5F5F5F"/>
+                </a:solidFill>
+                <a:latin typeface="Georgia"/>
+                <a:cs typeface="Georgia"/>
+              </a:rPr>
+              <a:t>Jan</a:t>
+            </a:r>
+            <a:r>
+              <a:rPr sz="3300" spc="-5" dirty="0" smtClean="0">
+                <a:solidFill>
+                  <a:srgbClr val="5F5F5F"/>
+                </a:solidFill>
+                <a:latin typeface="Georgia"/>
+                <a:cs typeface="Georgia"/>
+              </a:rPr>
+              <a:t> </a:t>
+            </a:r>
+            <a:r>
+              <a:rPr lang="en-US" sz="3300" spc="-5" dirty="0" smtClean="0">
+                <a:solidFill>
+                  <a:srgbClr val="5F5F5F"/>
+                </a:solidFill>
+                <a:latin typeface="Georgia"/>
+                <a:cs typeface="Georgia"/>
+              </a:rPr>
+              <a:t>1</a:t>
+            </a:r>
+            <a:r>
+              <a:rPr lang="en-US" sz="3300" dirty="0" smtClean="0">
+                <a:solidFill>
+                  <a:srgbClr val="5F5F5F"/>
+                </a:solidFill>
+                <a:latin typeface="Georgia"/>
+                <a:cs typeface="Georgia"/>
+              </a:rPr>
+              <a:t>1</a:t>
+            </a:r>
+            <a:r>
+              <a:rPr sz="3300" dirty="0" smtClean="0">
+                <a:solidFill>
+                  <a:srgbClr val="5F5F5F"/>
+                </a:solidFill>
+                <a:latin typeface="Georgia"/>
+                <a:cs typeface="Georgia"/>
+              </a:rPr>
+              <a:t> </a:t>
+            </a:r>
+            <a:r>
+              <a:rPr sz="3300" spc="-5" dirty="0">
+                <a:solidFill>
+                  <a:srgbClr val="5F5F5F"/>
+                </a:solidFill>
+                <a:latin typeface="Georgia"/>
+                <a:cs typeface="Georgia"/>
+              </a:rPr>
+              <a:t>to </a:t>
+            </a:r>
+            <a:r>
+              <a:rPr lang="en-US" sz="3300" dirty="0" smtClean="0">
+                <a:solidFill>
+                  <a:srgbClr val="5F5F5F"/>
+                </a:solidFill>
+                <a:latin typeface="Georgia"/>
+                <a:cs typeface="Georgia"/>
+              </a:rPr>
+              <a:t>Feb</a:t>
+            </a:r>
+            <a:r>
+              <a:rPr sz="3300" dirty="0" smtClean="0">
+                <a:solidFill>
+                  <a:srgbClr val="5F5F5F"/>
+                </a:solidFill>
+                <a:latin typeface="Georgia"/>
+                <a:cs typeface="Georgia"/>
+              </a:rPr>
+              <a:t> </a:t>
+            </a:r>
+            <a:r>
               <a:rPr lang="en-US" sz="3300" dirty="0">
                 <a:solidFill>
                   <a:srgbClr val="5F5F5F"/>
@@ -13112,7 +13232,27 @@
                 <a:latin typeface="Georgia"/>
                 <a:cs typeface="Georgia"/>
               </a:rPr>
-              <a:t>Wednesdays</a:t>
+              <a:t>8</a:t>
+            </a:r>
+            <a:r>
+              <a:rPr sz="3300" dirty="0" smtClean="0">
+                <a:solidFill>
+                  <a:srgbClr val="5F5F5F"/>
+                </a:solidFill>
+                <a:latin typeface="Georgia"/>
+                <a:cs typeface="Georgia"/>
+              </a:rPr>
+              <a:t>,</a:t>
+            </a:r>
+            <a:r>
+              <a:rPr sz="3300" spc="-60" dirty="0" smtClean="0">
+                <a:solidFill>
+                  <a:srgbClr val="5F5F5F"/>
+                </a:solidFill>
+                <a:latin typeface="Georgia"/>
+                <a:cs typeface="Georgia"/>
+              </a:rPr>
+              <a:t> </a:t>
             </a:r>
             <a:r>
               <a:rPr sz="3300" dirty="0">
@@ -13122,20 +13262,10 @@
                 <a:latin typeface="Georgia"/>
                 <a:cs typeface="Georgia"/>
               </a:rPr>
-              <a:t> from </a:t>
-            </a:r>
-            <a:r>
-              <a:rPr lang="en-US" sz="3300" spc="-5" dirty="0">
-                <a:solidFill>
-                  <a:srgbClr val="5F5F5F"/>
-                </a:solidFill>
-                <a:latin typeface="Georgia"/>
-                <a:cs typeface="Georgia"/>
-              </a:rPr>
-              <a:t>Nov</a:t>
-            </a:r>
-            <a:r>
-              <a:rPr sz="3300" spc="-5" dirty="0">
+              <a:t>from  6:30-9:30</a:t>
+            </a:r>
+            <a:r>
+              <a:rPr lang="en-US" sz="3300" dirty="0">
                 <a:solidFill>
                   <a:srgbClr val="5F5F5F"/>
                 </a:solidFill>
@@ -13145,6 +13275,16 @@
               <a:t> </a:t>
             </a:r>
             <a:r>
+              <a:rPr sz="3300" dirty="0">
+                <a:solidFill>
+                  <a:srgbClr val="5F5F5F"/>
+                </a:solidFill>
+                <a:latin typeface="Georgia"/>
+                <a:cs typeface="Georgia"/>
+              </a:rPr>
+              <a:t>p</a:t>
+            </a:r>
+            <a:r>
               <a:rPr lang="en-US" sz="3300" dirty="0">
                 <a:solidFill>
                   <a:srgbClr val="5F5F5F"/>
@@ -13152,7 +13292,7 @@
                 <a:latin typeface="Georgia"/>
                 <a:cs typeface="Georgia"/>
               </a:rPr>
-              <a:t>1</a:t>
+              <a:t>.</a:t>
             </a:r>
             <a:r>
               <a:rPr sz="3300" dirty="0">
@@ -13162,100 +13302,10 @@
                 <a:latin typeface="Georgia"/>
                 <a:cs typeface="Georgia"/>
               </a:rPr>
-              <a:t> </a:t>
-            </a:r>
-            <a:r>
-              <a:rPr sz="3300" spc="-5" dirty="0">
-                <a:solidFill>
-                  <a:srgbClr val="5F5F5F"/>
-                </a:solidFill>
-                <a:latin typeface="Georgia"/>
-                <a:cs typeface="Georgia"/>
-              </a:rPr>
-              <a:t>to </a:t>
-            </a:r>
-            <a:r>
-              <a:rPr lang="en-US" sz="3300" dirty="0">
-                <a:solidFill>
-                  <a:srgbClr val="5F5F5F"/>
-                </a:solidFill>
-                <a:latin typeface="Georgia"/>
-                <a:cs typeface="Georgia"/>
-              </a:rPr>
-              <a:t>Dec</a:t>
-            </a:r>
-            <a:r>
-              <a:rPr sz="3300" dirty="0">
-                <a:solidFill>
-                  <a:srgbClr val="5F5F5F"/>
-                </a:solidFill>
-                <a:latin typeface="Georgia"/>
-                <a:cs typeface="Georgia"/>
-              </a:rPr>
-              <a:t> </a:t>
-            </a:r>
-            <a:r>
-              <a:rPr lang="en-US" sz="3300" dirty="0">
-                <a:solidFill>
-                  <a:srgbClr val="5F5F5F"/>
-                </a:solidFill>
-                <a:latin typeface="Georgia"/>
-                <a:cs typeface="Georgia"/>
-              </a:rPr>
-              <a:t>6</a:t>
-            </a:r>
-            <a:r>
-              <a:rPr sz="3300" dirty="0">
-                <a:solidFill>
-                  <a:srgbClr val="5F5F5F"/>
-                </a:solidFill>
-                <a:latin typeface="Georgia"/>
-                <a:cs typeface="Georgia"/>
-              </a:rPr>
-              <a:t>,</a:t>
-            </a:r>
-            <a:r>
-              <a:rPr sz="3300" spc="-60" dirty="0">
-                <a:solidFill>
-                  <a:srgbClr val="5F5F5F"/>
-                </a:solidFill>
-                <a:latin typeface="Georgia"/>
-                <a:cs typeface="Georgia"/>
-              </a:rPr>
-              <a:t> </a:t>
-            </a:r>
-            <a:r>
-              <a:rPr sz="3300" dirty="0">
-                <a:solidFill>
-                  <a:srgbClr val="5F5F5F"/>
-                </a:solidFill>
-                <a:latin typeface="Georgia"/>
-                <a:cs typeface="Georgia"/>
-              </a:rPr>
-              <a:t>from  6:30-9:30</a:t>
-            </a:r>
-            <a:r>
-              <a:rPr lang="en-US" sz="3300" dirty="0">
-                <a:solidFill>
-                  <a:srgbClr val="5F5F5F"/>
-                </a:solidFill>
-                <a:latin typeface="Georgia"/>
-                <a:cs typeface="Georgia"/>
-              </a:rPr>
-              <a:t> </a:t>
-            </a:r>
-            <a:r>
-              <a:rPr sz="3300" dirty="0">
-                <a:solidFill>
-                  <a:srgbClr val="5F5F5F"/>
-                </a:solidFill>
-                <a:latin typeface="Georgia"/>
-                <a:cs typeface="Georgia"/>
-              </a:rPr>
-              <a:t>p</a:t>
-            </a:r>
-            <a:r>
-              <a:rPr lang="en-US" sz="3300" dirty="0">
+              <a:t>m</a:t>
+            </a:r>
+            <a:r>
+              <a:rPr lang="en-US" sz="3300" dirty="0" smtClean="0">
                 <a:solidFill>
                   <a:srgbClr val="5F5F5F"/>
                 </a:solidFill>
@@ -13263,47 +13313,6 @@
                 <a:cs typeface="Georgia"/>
               </a:rPr>
               <a:t>.</a:t>
-            </a:r>
-            <a:r>
-              <a:rPr sz="3300" dirty="0">
-                <a:solidFill>
-                  <a:srgbClr val="5F5F5F"/>
-                </a:solidFill>
-                <a:latin typeface="Georgia"/>
-                <a:cs typeface="Georgia"/>
-              </a:rPr>
-              <a:t>m</a:t>
-            </a:r>
-            <a:r>
-              <a:rPr lang="en-US" sz="3300" dirty="0">
-                <a:solidFill>
-                  <a:srgbClr val="5F5F5F"/>
-                </a:solidFill>
-                <a:latin typeface="Georgia"/>
-                <a:cs typeface="Georgia"/>
-              </a:rPr>
-              <a:t>.</a:t>
-            </a:r>
-          </a:p>
-          <a:p>
-            <a:pPr marL="897255" marR="296545" lvl="1" indent="-427355">
-              <a:buSzPct val="74242"/>
-              <a:buFont typeface="Lora"/>
-              <a:buChar char="•"/>
-              <a:tabLst>
-                <a:tab pos="440055" algn="l"/>
-                <a:tab pos="440690" algn="l"/>
-              </a:tabLst>
-            </a:pPr>
-            <a:r>
-              <a:rPr lang="en-US" sz="2800" dirty="0">
-                <a:solidFill>
-                  <a:srgbClr val="5F5F5F"/>
-                </a:solidFill>
-                <a:latin typeface="Georgia"/>
-                <a:cs typeface="Georgia"/>
-              </a:rPr>
-              <a:t>No class week of Thanksgiving</a:t>
             </a:r>
             <a:endParaRPr sz="2800" dirty="0">
               <a:latin typeface="Georgia"/>
@@ -18576,7 +18585,7 @@
           <p:cNvPr id="8" name="Rectangle 7">
             <a:extLst>
               <a:ext uri="{FF2B5EF4-FFF2-40B4-BE49-F238E27FC236}">
-                <a16:creationId xmlns:a16="http://schemas.microsoft.com/office/drawing/2014/main" id="{2801331B-CE52-4F2B-BBBA-46C8F1D11A28}"/>
+                <a16:creationId xmlns:a16="http://schemas.microsoft.com/office/drawing/2014/main" xmlns="" id="{2801331B-CE52-4F2B-BBBA-46C8F1D11A28}"/>
               </a:ext>
             </a:extLst>
           </p:cNvPr>
@@ -28607,7 +28616,7 @@
           <p:cNvPr id="8" name="Picture 7">
             <a:extLst>
               <a:ext uri="{FF2B5EF4-FFF2-40B4-BE49-F238E27FC236}">
-                <a16:creationId xmlns:a16="http://schemas.microsoft.com/office/drawing/2014/main" id="{C7C9DAFA-0C6A-43A5-B549-F67B33448717}"/>
+                <a16:creationId xmlns:a16="http://schemas.microsoft.com/office/drawing/2014/main" xmlns="" id="{C7C9DAFA-0C6A-43A5-B549-F67B33448717}"/>
               </a:ext>
             </a:extLst>
           </p:cNvPr>
@@ -28637,7 +28646,7 @@
           <p:cNvPr id="9" name="Rectangle 8">
             <a:extLst>
               <a:ext uri="{FF2B5EF4-FFF2-40B4-BE49-F238E27FC236}">
-                <a16:creationId xmlns:a16="http://schemas.microsoft.com/office/drawing/2014/main" id="{6AC2F42D-4351-4B04-9653-16B5E5275A9C}"/>
+                <a16:creationId xmlns:a16="http://schemas.microsoft.com/office/drawing/2014/main" xmlns="" id="{6AC2F42D-4351-4B04-9653-16B5E5275A9C}"/>
               </a:ext>
             </a:extLst>
           </p:cNvPr>
@@ -28688,7 +28697,7 @@
           <p:cNvPr id="10" name="Rectangle 9">
             <a:extLst>
               <a:ext uri="{FF2B5EF4-FFF2-40B4-BE49-F238E27FC236}">
-                <a16:creationId xmlns:a16="http://schemas.microsoft.com/office/drawing/2014/main" id="{A25735EF-2D89-4819-A53B-790AC14DCE7A}"/>
+                <a16:creationId xmlns:a16="http://schemas.microsoft.com/office/drawing/2014/main" xmlns="" id="{A25735EF-2D89-4819-A53B-790AC14DCE7A}"/>
               </a:ext>
             </a:extLst>
           </p:cNvPr>
@@ -29001,7 +29010,7 @@
           <p:cNvPr id="5" name="Picture 4">
             <a:extLst>
               <a:ext uri="{FF2B5EF4-FFF2-40B4-BE49-F238E27FC236}">
-                <a16:creationId xmlns:a16="http://schemas.microsoft.com/office/drawing/2014/main" id="{566F5C96-B47B-4D64-8817-2344BC01C95B}"/>
+                <a16:creationId xmlns:a16="http://schemas.microsoft.com/office/drawing/2014/main" xmlns="" id="{566F5C96-B47B-4D64-8817-2344BC01C95B}"/>
               </a:ext>
             </a:extLst>
           </p:cNvPr>
@@ -29031,7 +29040,7 @@
           <p:cNvPr id="6" name="Rectangle 5">
             <a:extLst>
               <a:ext uri="{FF2B5EF4-FFF2-40B4-BE49-F238E27FC236}">
-                <a16:creationId xmlns:a16="http://schemas.microsoft.com/office/drawing/2014/main" id="{2A0AF151-C463-45FF-9E0C-C46B12438D6B}"/>
+                <a16:creationId xmlns:a16="http://schemas.microsoft.com/office/drawing/2014/main" xmlns="" id="{2A0AF151-C463-45FF-9E0C-C46B12438D6B}"/>
               </a:ext>
             </a:extLst>
           </p:cNvPr>
@@ -29265,7 +29274,7 @@
           <p:cNvPr id="5" name="Picture 4">
             <a:extLst>
               <a:ext uri="{FF2B5EF4-FFF2-40B4-BE49-F238E27FC236}">
-                <a16:creationId xmlns:a16="http://schemas.microsoft.com/office/drawing/2014/main" id="{566F5C96-B47B-4D64-8817-2344BC01C95B}"/>
+                <a16:creationId xmlns:a16="http://schemas.microsoft.com/office/drawing/2014/main" xmlns="" id="{566F5C96-B47B-4D64-8817-2344BC01C95B}"/>
               </a:ext>
             </a:extLst>
           </p:cNvPr>
@@ -29295,7 +29304,7 @@
           <p:cNvPr id="6" name="Rectangle 5">
             <a:extLst>
               <a:ext uri="{FF2B5EF4-FFF2-40B4-BE49-F238E27FC236}">
-                <a16:creationId xmlns:a16="http://schemas.microsoft.com/office/drawing/2014/main" id="{2A0AF151-C463-45FF-9E0C-C46B12438D6B}"/>
+                <a16:creationId xmlns:a16="http://schemas.microsoft.com/office/drawing/2014/main" xmlns="" id="{2A0AF151-C463-45FF-9E0C-C46B12438D6B}"/>
               </a:ext>
             </a:extLst>
           </p:cNvPr>
@@ -29354,7 +29363,7 @@
           <p:cNvPr id="7" name="Picture 6">
             <a:extLst>
               <a:ext uri="{FF2B5EF4-FFF2-40B4-BE49-F238E27FC236}">
-                <a16:creationId xmlns:a16="http://schemas.microsoft.com/office/drawing/2014/main" id="{C264C0D2-6000-4B85-96A0-033396BC535F}"/>
+                <a16:creationId xmlns:a16="http://schemas.microsoft.com/office/drawing/2014/main" xmlns="" id="{C264C0D2-6000-4B85-96A0-033396BC535F}"/>
               </a:ext>
             </a:extLst>
           </p:cNvPr>
@@ -29937,7 +29946,7 @@
           <p:cNvPr id="6" name="Rectangle 5">
             <a:extLst>
               <a:ext uri="{FF2B5EF4-FFF2-40B4-BE49-F238E27FC236}">
-                <a16:creationId xmlns:a16="http://schemas.microsoft.com/office/drawing/2014/main" id="{2A0AF151-C463-45FF-9E0C-C46B12438D6B}"/>
+                <a16:creationId xmlns:a16="http://schemas.microsoft.com/office/drawing/2014/main" xmlns="" id="{2A0AF151-C463-45FF-9E0C-C46B12438D6B}"/>
               </a:ext>
             </a:extLst>
           </p:cNvPr>
@@ -30050,7 +30059,7 @@
           <p:cNvPr id="13" name="Group 12">
             <a:extLst>
               <a:ext uri="{FF2B5EF4-FFF2-40B4-BE49-F238E27FC236}">
-                <a16:creationId xmlns:a16="http://schemas.microsoft.com/office/drawing/2014/main" id="{9BEF821C-6B18-489C-8DD6-6B107BDE3358}"/>
+                <a16:creationId xmlns:a16="http://schemas.microsoft.com/office/drawing/2014/main" xmlns="" id="{9BEF821C-6B18-489C-8DD6-6B107BDE3358}"/>
               </a:ext>
             </a:extLst>
           </p:cNvPr>
@@ -30070,7 +30079,7 @@
             <p:cNvPr id="11" name="Picture 2" descr="laptop_PNG8915.png (2046×1681)">
               <a:extLst>
                 <a:ext uri="{FF2B5EF4-FFF2-40B4-BE49-F238E27FC236}">
-                  <a16:creationId xmlns:a16="http://schemas.microsoft.com/office/drawing/2014/main" id="{533D1EA0-D356-465B-B013-BE5185288069}"/>
+                  <a16:creationId xmlns:a16="http://schemas.microsoft.com/office/drawing/2014/main" xmlns="" id="{533D1EA0-D356-465B-B013-BE5185288069}"/>
                 </a:ext>
               </a:extLst>
             </p:cNvPr>
@@ -30117,7 +30126,7 @@
             <p:cNvPr id="7" name="Picture 6">
               <a:extLst>
                 <a:ext uri="{FF2B5EF4-FFF2-40B4-BE49-F238E27FC236}">
-                  <a16:creationId xmlns:a16="http://schemas.microsoft.com/office/drawing/2014/main" id="{C264C0D2-6000-4B85-96A0-033396BC535F}"/>
+                  <a16:creationId xmlns:a16="http://schemas.microsoft.com/office/drawing/2014/main" xmlns="" id="{C264C0D2-6000-4B85-96A0-033396BC535F}"/>
                 </a:ext>
               </a:extLst>
             </p:cNvPr>
@@ -30147,7 +30156,7 @@
           <p:cNvPr id="14" name="Picture 13">
             <a:extLst>
               <a:ext uri="{FF2B5EF4-FFF2-40B4-BE49-F238E27FC236}">
-                <a16:creationId xmlns:a16="http://schemas.microsoft.com/office/drawing/2014/main" id="{97AD0940-8B59-4009-B1ED-49D3AB6FAF06}"/>
+                <a16:creationId xmlns:a16="http://schemas.microsoft.com/office/drawing/2014/main" xmlns="" id="{97AD0940-8B59-4009-B1ED-49D3AB6FAF06}"/>
               </a:ext>
             </a:extLst>
           </p:cNvPr>
@@ -30767,15 +30776,14 @@
               <a:t> at </a:t>
             </a:r>
             <a:r>
-              <a:rPr lang="en-US" sz="3600" spc="-5" dirty="0">
-                <a:solidFill>
-                  <a:srgbClr val="5F5F5F"/>
-                </a:solidFill>
-                <a:latin typeface="Georgia"/>
-                <a:cs typeface="Georgia"/>
-                <a:hlinkClick r:id="rId2"/>
-              </a:rPr>
-              <a:t>beckjohnson@gmail.com</a:t>
+              <a:rPr lang="en-US" sz="3600" spc="-5" dirty="0" smtClean="0">
+                <a:solidFill>
+                  <a:srgbClr val="5F5F5F"/>
+                </a:solidFill>
+                <a:latin typeface="Georgia"/>
+                <a:cs typeface="Georgia"/>
+              </a:rPr>
+              <a:t>aaron@bronow.net</a:t>
             </a:r>
             <a:endParaRPr sz="3600" dirty="0">
               <a:latin typeface="Georgia"/>
@@ -30933,7 +30941,7 @@
             <a:avLst/>
           </a:prstGeom>
           <a:blipFill>
-            <a:blip r:embed="rId3" cstate="print"/>
+            <a:blip r:embed="rId2" cstate="print"/>
             <a:stretch>
               <a:fillRect/>
             </a:stretch>

</xml_diff>

<commit_message>
add relative path example page
</commit_message>
<xml_diff>
--- a/slides/week-1.pptx
+++ b/slides/week-1.pptx
@@ -5,7 +5,7 @@
     <p:sldMasterId id="2147483648" r:id="rId1"/>
   </p:sldMasterIdLst>
   <p:notesMasterIdLst>
-    <p:notesMasterId r:id="rId64"/>
+    <p:notesMasterId r:id="rId65"/>
   </p:notesMasterIdLst>
   <p:sldIdLst>
     <p:sldId id="256" r:id="rId2"/>
@@ -59,17 +59,18 @@
     <p:sldId id="300" r:id="rId50"/>
     <p:sldId id="302" r:id="rId51"/>
     <p:sldId id="303" r:id="rId52"/>
-    <p:sldId id="336" r:id="rId53"/>
-    <p:sldId id="337" r:id="rId54"/>
-    <p:sldId id="338" r:id="rId55"/>
-    <p:sldId id="339" r:id="rId56"/>
-    <p:sldId id="340" r:id="rId57"/>
-    <p:sldId id="343" r:id="rId58"/>
-    <p:sldId id="304" r:id="rId59"/>
-    <p:sldId id="346" r:id="rId60"/>
-    <p:sldId id="347" r:id="rId61"/>
-    <p:sldId id="345" r:id="rId62"/>
-    <p:sldId id="342" r:id="rId63"/>
+    <p:sldId id="350" r:id="rId53"/>
+    <p:sldId id="336" r:id="rId54"/>
+    <p:sldId id="337" r:id="rId55"/>
+    <p:sldId id="338" r:id="rId56"/>
+    <p:sldId id="339" r:id="rId57"/>
+    <p:sldId id="340" r:id="rId58"/>
+    <p:sldId id="343" r:id="rId59"/>
+    <p:sldId id="304" r:id="rId60"/>
+    <p:sldId id="346" r:id="rId61"/>
+    <p:sldId id="347" r:id="rId62"/>
+    <p:sldId id="345" r:id="rId63"/>
+    <p:sldId id="342" r:id="rId64"/>
   </p:sldIdLst>
   <p:sldSz cx="13004800" cy="9753600"/>
   <p:notesSz cx="13004800" cy="9753600"/>
@@ -2296,6 +2297,13 @@
   <p:clrMapOvr>
     <a:masterClrMapping/>
   </p:clrMapOvr>
+  <p:timing>
+    <p:tnLst>
+      <p:par>
+        <p:cTn id="1" dur="indefinite" restart="never" nodeType="tmRoot"/>
+      </p:par>
+    </p:tnLst>
+  </p:timing>
 </p:sld>
 </file>
 
@@ -3474,6 +3482,13 @@
   <p:clrMapOvr>
     <a:masterClrMapping/>
   </p:clrMapOvr>
+  <p:timing>
+    <p:tnLst>
+      <p:par>
+        <p:cTn id="1" dur="indefinite" restart="never" nodeType="tmRoot"/>
+      </p:par>
+    </p:tnLst>
+  </p:timing>
 </p:sld>
 </file>
 
@@ -4509,6 +4524,13 @@
   <p:clrMapOvr>
     <a:masterClrMapping/>
   </p:clrMapOvr>
+  <p:timing>
+    <p:tnLst>
+      <p:par>
+        <p:cTn id="1" dur="indefinite" restart="never" nodeType="tmRoot"/>
+      </p:par>
+    </p:tnLst>
+  </p:timing>
 </p:sld>
 </file>
 
@@ -4660,6 +4682,13 @@
   <p:clrMapOvr>
     <a:masterClrMapping/>
   </p:clrMapOvr>
+  <p:timing>
+    <p:tnLst>
+      <p:par>
+        <p:cTn id="1" dur="indefinite" restart="never" nodeType="tmRoot"/>
+      </p:par>
+    </p:tnLst>
+  </p:timing>
 </p:sld>
 </file>
 
@@ -5210,6 +5239,13 @@
   <p:clrMapOvr>
     <a:masterClrMapping/>
   </p:clrMapOvr>
+  <p:timing>
+    <p:tnLst>
+      <p:par>
+        <p:cTn id="1" dur="indefinite" restart="never" nodeType="tmRoot"/>
+      </p:par>
+    </p:tnLst>
+  </p:timing>
 </p:sld>
 </file>
 
@@ -5701,6 +5737,13 @@
   <p:clrMapOvr>
     <a:masterClrMapping/>
   </p:clrMapOvr>
+  <p:timing>
+    <p:tnLst>
+      <p:par>
+        <p:cTn id="1" dur="indefinite" restart="never" nodeType="tmRoot"/>
+      </p:par>
+    </p:tnLst>
+  </p:timing>
 </p:sld>
 </file>
 
@@ -6003,6 +6046,13 @@
   <p:clrMapOvr>
     <a:masterClrMapping/>
   </p:clrMapOvr>
+  <p:timing>
+    <p:tnLst>
+      <p:par>
+        <p:cTn id="1" dur="indefinite" restart="never" nodeType="tmRoot"/>
+      </p:par>
+    </p:tnLst>
+  </p:timing>
 </p:sld>
 </file>
 
@@ -6591,6 +6641,13 @@
   <p:clrMapOvr>
     <a:masterClrMapping/>
   </p:clrMapOvr>
+  <p:timing>
+    <p:tnLst>
+      <p:par>
+        <p:cTn id="1" dur="indefinite" restart="never" nodeType="tmRoot"/>
+      </p:par>
+    </p:tnLst>
+  </p:timing>
 </p:sld>
 </file>
 
@@ -6776,6 +6833,13 @@
   <p:clrMapOvr>
     <a:masterClrMapping/>
   </p:clrMapOvr>
+  <p:timing>
+    <p:tnLst>
+      <p:par>
+        <p:cTn id="1" dur="indefinite" restart="never" nodeType="tmRoot"/>
+      </p:par>
+    </p:tnLst>
+  </p:timing>
 </p:sld>
 </file>
 
@@ -6932,6 +6996,13 @@
   <p:clrMapOvr>
     <a:masterClrMapping/>
   </p:clrMapOvr>
+  <p:timing>
+    <p:tnLst>
+      <p:par>
+        <p:cTn id="1" dur="indefinite" restart="never" nodeType="tmRoot"/>
+      </p:par>
+    </p:tnLst>
+  </p:timing>
 </p:sld>
 </file>
 
@@ -7036,6 +7107,13 @@
   <p:clrMapOvr>
     <a:masterClrMapping/>
   </p:clrMapOvr>
+  <p:timing>
+    <p:tnLst>
+      <p:par>
+        <p:cTn id="1" dur="indefinite" restart="never" nodeType="tmRoot"/>
+      </p:par>
+    </p:tnLst>
+  </p:timing>
 </p:sld>
 </file>
 
@@ -7575,6 +7653,13 @@
   <p:clrMapOvr>
     <a:masterClrMapping/>
   </p:clrMapOvr>
+  <p:timing>
+    <p:tnLst>
+      <p:par>
+        <p:cTn id="1" dur="indefinite" restart="never" nodeType="tmRoot"/>
+      </p:par>
+    </p:tnLst>
+  </p:timing>
 </p:sld>
 </file>
 
@@ -8602,6 +8687,13 @@
   <p:clrMapOvr>
     <a:masterClrMapping/>
   </p:clrMapOvr>
+  <p:timing>
+    <p:tnLst>
+      <p:par>
+        <p:cTn id="1" dur="indefinite" restart="never" nodeType="tmRoot"/>
+      </p:par>
+    </p:tnLst>
+  </p:timing>
 </p:sld>
 </file>
 
@@ -9320,6 +9412,13 @@
   <p:clrMapOvr>
     <a:masterClrMapping/>
   </p:clrMapOvr>
+  <p:timing>
+    <p:tnLst>
+      <p:par>
+        <p:cTn id="1" dur="indefinite" restart="never" nodeType="tmRoot"/>
+      </p:par>
+    </p:tnLst>
+  </p:timing>
 </p:sld>
 </file>
 
@@ -9569,6 +9668,13 @@
   <p:clrMapOvr>
     <a:masterClrMapping/>
   </p:clrMapOvr>
+  <p:timing>
+    <p:tnLst>
+      <p:par>
+        <p:cTn id="1" dur="indefinite" restart="never" nodeType="tmRoot"/>
+      </p:par>
+    </p:tnLst>
+  </p:timing>
 </p:sld>
 </file>
 
@@ -10188,6 +10294,13 @@
   <p:clrMapOvr>
     <a:masterClrMapping/>
   </p:clrMapOvr>
+  <p:timing>
+    <p:tnLst>
+      <p:par>
+        <p:cTn id="1" dur="indefinite" restart="never" nodeType="tmRoot"/>
+      </p:par>
+    </p:tnLst>
+  </p:timing>
 </p:sld>
 </file>
 
@@ -10663,6 +10776,13 @@
   <p:clrMapOvr>
     <a:masterClrMapping/>
   </p:clrMapOvr>
+  <p:timing>
+    <p:tnLst>
+      <p:par>
+        <p:cTn id="1" dur="indefinite" restart="never" nodeType="tmRoot"/>
+      </p:par>
+    </p:tnLst>
+  </p:timing>
 </p:sld>
 </file>
 
@@ -11001,6 +11121,13 @@
   <p:clrMapOvr>
     <a:masterClrMapping/>
   </p:clrMapOvr>
+  <p:timing>
+    <p:tnLst>
+      <p:par>
+        <p:cTn id="1" dur="indefinite" restart="never" nodeType="tmRoot"/>
+      </p:par>
+    </p:tnLst>
+  </p:timing>
 </p:sld>
 </file>
 
@@ -11560,6 +11687,13 @@
   <p:clrMapOvr>
     <a:masterClrMapping/>
   </p:clrMapOvr>
+  <p:timing>
+    <p:tnLst>
+      <p:par>
+        <p:cTn id="1" dur="indefinite" restart="never" nodeType="tmRoot"/>
+      </p:par>
+    </p:tnLst>
+  </p:timing>
 </p:sld>
 </file>
 
@@ -12107,6 +12241,13 @@
   <p:clrMapOvr>
     <a:masterClrMapping/>
   </p:clrMapOvr>
+  <p:timing>
+    <p:tnLst>
+      <p:par>
+        <p:cTn id="1" dur="indefinite" restart="never" nodeType="tmRoot"/>
+      </p:par>
+    </p:tnLst>
+  </p:timing>
 </p:sld>
 </file>
 
@@ -12318,6 +12459,13 @@
   <p:clrMapOvr>
     <a:masterClrMapping/>
   </p:clrMapOvr>
+  <p:timing>
+    <p:tnLst>
+      <p:par>
+        <p:cTn id="1" dur="indefinite" restart="never" nodeType="tmRoot"/>
+      </p:par>
+    </p:tnLst>
+  </p:timing>
 </p:sld>
 </file>
 
@@ -12916,6 +13064,13 @@
   <p:clrMapOvr>
     <a:masterClrMapping/>
   </p:clrMapOvr>
+  <p:timing>
+    <p:tnLst>
+      <p:par>
+        <p:cTn id="1" dur="indefinite" restart="never" nodeType="tmRoot"/>
+      </p:par>
+    </p:tnLst>
+  </p:timing>
 </p:sld>
 </file>
 
@@ -13691,6 +13846,13 @@
   <p:clrMapOvr>
     <a:masterClrMapping/>
   </p:clrMapOvr>
+  <p:timing>
+    <p:tnLst>
+      <p:par>
+        <p:cTn id="1" dur="indefinite" restart="never" nodeType="tmRoot"/>
+      </p:par>
+    </p:tnLst>
+  </p:timing>
 </p:sld>
 </file>
 
@@ -14397,6 +14559,13 @@
   <p:clrMapOvr>
     <a:masterClrMapping/>
   </p:clrMapOvr>
+  <p:timing>
+    <p:tnLst>
+      <p:par>
+        <p:cTn id="1" dur="indefinite" restart="never" nodeType="tmRoot"/>
+      </p:par>
+    </p:tnLst>
+  </p:timing>
 </p:sld>
 </file>
 
@@ -14984,6 +15153,13 @@
   <p:clrMapOvr>
     <a:masterClrMapping/>
   </p:clrMapOvr>
+  <p:timing>
+    <p:tnLst>
+      <p:par>
+        <p:cTn id="1" dur="indefinite" restart="never" nodeType="tmRoot"/>
+      </p:par>
+    </p:tnLst>
+  </p:timing>
 </p:sld>
 </file>
 
@@ -15591,6 +15767,13 @@
   <p:clrMapOvr>
     <a:masterClrMapping/>
   </p:clrMapOvr>
+  <p:timing>
+    <p:tnLst>
+      <p:par>
+        <p:cTn id="1" dur="indefinite" restart="never" nodeType="tmRoot"/>
+      </p:par>
+    </p:tnLst>
+  </p:timing>
 </p:sld>
 </file>
 
@@ -16112,6 +16295,13 @@
   <p:clrMapOvr>
     <a:masterClrMapping/>
   </p:clrMapOvr>
+  <p:timing>
+    <p:tnLst>
+      <p:par>
+        <p:cTn id="1" dur="indefinite" restart="never" nodeType="tmRoot"/>
+      </p:par>
+    </p:tnLst>
+  </p:timing>
 </p:sld>
 </file>
 
@@ -16704,6 +16894,13 @@
   <p:clrMapOvr>
     <a:masterClrMapping/>
   </p:clrMapOvr>
+  <p:timing>
+    <p:tnLst>
+      <p:par>
+        <p:cTn id="1" dur="indefinite" restart="never" nodeType="tmRoot"/>
+      </p:par>
+    </p:tnLst>
+  </p:timing>
 </p:sld>
 </file>
 
@@ -17330,6 +17527,13 @@
   <p:clrMapOvr>
     <a:masterClrMapping/>
   </p:clrMapOvr>
+  <p:timing>
+    <p:tnLst>
+      <p:par>
+        <p:cTn id="1" dur="indefinite" restart="never" nodeType="tmRoot"/>
+      </p:par>
+    </p:tnLst>
+  </p:timing>
 </p:sld>
 </file>
 
@@ -18017,6 +18221,13 @@
   <p:clrMapOvr>
     <a:masterClrMapping/>
   </p:clrMapOvr>
+  <p:timing>
+    <p:tnLst>
+      <p:par>
+        <p:cTn id="1" dur="indefinite" restart="never" nodeType="tmRoot"/>
+      </p:par>
+    </p:tnLst>
+  </p:timing>
 </p:sld>
 </file>
 
@@ -18472,6 +18683,13 @@
   <p:clrMapOvr>
     <a:masterClrMapping/>
   </p:clrMapOvr>
+  <p:timing>
+    <p:tnLst>
+      <p:par>
+        <p:cTn id="1" dur="indefinite" restart="never" nodeType="tmRoot"/>
+      </p:par>
+    </p:tnLst>
+  </p:timing>
 </p:sld>
 </file>
 
@@ -18856,6 +19074,13 @@
   <p:clrMapOvr>
     <a:masterClrMapping/>
   </p:clrMapOvr>
+  <p:timing>
+    <p:tnLst>
+      <p:par>
+        <p:cTn id="1" dur="indefinite" restart="never" nodeType="tmRoot"/>
+      </p:par>
+    </p:tnLst>
+  </p:timing>
 </p:sld>
 </file>
 
@@ -19318,6 +19543,13 @@
   <p:clrMapOvr>
     <a:masterClrMapping/>
   </p:clrMapOvr>
+  <p:timing>
+    <p:tnLst>
+      <p:par>
+        <p:cTn id="1" dur="indefinite" restart="never" nodeType="tmRoot"/>
+      </p:par>
+    </p:tnLst>
+  </p:timing>
 </p:sld>
 </file>
 
@@ -20017,6 +20249,13 @@
   <p:clrMapOvr>
     <a:masterClrMapping/>
   </p:clrMapOvr>
+  <p:timing>
+    <p:tnLst>
+      <p:par>
+        <p:cTn id="1" dur="indefinite" restart="never" nodeType="tmRoot"/>
+      </p:par>
+    </p:tnLst>
+  </p:timing>
 </p:sld>
 </file>
 
@@ -20598,6 +20837,13 @@
   <p:clrMapOvr>
     <a:masterClrMapping/>
   </p:clrMapOvr>
+  <p:timing>
+    <p:tnLst>
+      <p:par>
+        <p:cTn id="1" dur="indefinite" restart="never" nodeType="tmRoot"/>
+      </p:par>
+    </p:tnLst>
+  </p:timing>
 </p:sld>
 </file>
 
@@ -21192,6 +21438,13 @@
   <p:clrMapOvr>
     <a:masterClrMapping/>
   </p:clrMapOvr>
+  <p:timing>
+    <p:tnLst>
+      <p:par>
+        <p:cTn id="1" dur="indefinite" restart="never" nodeType="tmRoot"/>
+      </p:par>
+    </p:tnLst>
+  </p:timing>
 </p:sld>
 </file>
 
@@ -21716,6 +21969,13 @@
   <p:clrMapOvr>
     <a:masterClrMapping/>
   </p:clrMapOvr>
+  <p:timing>
+    <p:tnLst>
+      <p:par>
+        <p:cTn id="1" dur="indefinite" restart="never" nodeType="tmRoot"/>
+      </p:par>
+    </p:tnLst>
+  </p:timing>
 </p:sld>
 </file>
 
@@ -22529,6 +22789,13 @@
   <p:clrMapOvr>
     <a:masterClrMapping/>
   </p:clrMapOvr>
+  <p:timing>
+    <p:tnLst>
+      <p:par>
+        <p:cTn id="1" dur="indefinite" restart="never" nodeType="tmRoot"/>
+      </p:par>
+    </p:tnLst>
+  </p:timing>
 </p:sld>
 </file>
 
@@ -23033,6 +23300,13 @@
   <p:clrMapOvr>
     <a:masterClrMapping/>
   </p:clrMapOvr>
+  <p:timing>
+    <p:tnLst>
+      <p:par>
+        <p:cTn id="1" dur="indefinite" restart="never" nodeType="tmRoot"/>
+      </p:par>
+    </p:tnLst>
+  </p:timing>
 </p:sld>
 </file>
 
@@ -23474,6 +23748,13 @@
   <p:clrMapOvr>
     <a:masterClrMapping/>
   </p:clrMapOvr>
+  <p:timing>
+    <p:tnLst>
+      <p:par>
+        <p:cTn id="1" dur="indefinite" restart="never" nodeType="tmRoot"/>
+      </p:par>
+    </p:tnLst>
+  </p:timing>
 </p:sld>
 </file>
 
@@ -24131,6 +24412,13 @@
   <p:clrMapOvr>
     <a:masterClrMapping/>
   </p:clrMapOvr>
+  <p:timing>
+    <p:tnLst>
+      <p:par>
+        <p:cTn id="1" dur="indefinite" restart="never" nodeType="tmRoot"/>
+      </p:par>
+    </p:tnLst>
+  </p:timing>
 </p:sld>
 </file>
 
@@ -24419,6 +24707,13 @@
   <p:clrMapOvr>
     <a:masterClrMapping/>
   </p:clrMapOvr>
+  <p:timing>
+    <p:tnLst>
+      <p:par>
+        <p:cTn id="1" dur="indefinite" restart="never" nodeType="tmRoot"/>
+      </p:par>
+    </p:tnLst>
+  </p:timing>
 </p:sld>
 </file>
 
@@ -25088,6 +25383,13 @@
   <p:clrMapOvr>
     <a:masterClrMapping/>
   </p:clrMapOvr>
+  <p:timing>
+    <p:tnLst>
+      <p:par>
+        <p:cTn id="1" dur="indefinite" restart="never" nodeType="tmRoot"/>
+      </p:par>
+    </p:tnLst>
+  </p:timing>
 </p:sld>
 </file>
 
@@ -25629,6 +25931,13 @@
   <p:clrMapOvr>
     <a:masterClrMapping/>
   </p:clrMapOvr>
+  <p:timing>
+    <p:tnLst>
+      <p:par>
+        <p:cTn id="1" dur="indefinite" restart="never" nodeType="tmRoot"/>
+      </p:par>
+    </p:tnLst>
+  </p:timing>
 </p:sld>
 </file>
 
@@ -25993,6 +26302,13 @@
   <p:clrMapOvr>
     <a:masterClrMapping/>
   </p:clrMapOvr>
+  <p:timing>
+    <p:tnLst>
+      <p:par>
+        <p:cTn id="1" dur="indefinite" restart="never" nodeType="tmRoot"/>
+      </p:par>
+    </p:tnLst>
+  </p:timing>
 </p:sld>
 </file>
 
@@ -26143,6 +26459,13 @@
   <p:clrMapOvr>
     <a:masterClrMapping/>
   </p:clrMapOvr>
+  <p:timing>
+    <p:tnLst>
+      <p:par>
+        <p:cTn id="1" dur="indefinite" restart="never" nodeType="tmRoot"/>
+      </p:par>
+    </p:tnLst>
+  </p:timing>
 </p:sld>
 </file>
 
@@ -26977,10 +27300,1482 @@
   <p:clrMapOvr>
     <a:masterClrMapping/>
   </p:clrMapOvr>
+  <p:timing>
+    <p:tnLst>
+      <p:par>
+        <p:cTn id="1" dur="indefinite" restart="never" nodeType="tmRoot"/>
+      </p:par>
+    </p:tnLst>
+  </p:timing>
 </p:sld>
 </file>
 
 <file path=ppt/slides/slide52.xml><?xml version="1.0" encoding="utf-8"?>
+<p:sld xmlns:a="http://schemas.openxmlformats.org/drawingml/2006/main" xmlns:r="http://schemas.openxmlformats.org/officeDocument/2006/relationships" xmlns:p="http://schemas.openxmlformats.org/presentationml/2006/main" showMasterSp="0">
+  <p:cSld>
+    <p:spTree>
+      <p:nvGrpSpPr>
+        <p:cNvPr id="1" name=""/>
+        <p:cNvGrpSpPr/>
+        <p:nvPr/>
+      </p:nvGrpSpPr>
+      <p:grpSpPr>
+        <a:xfrm>
+          <a:off x="0" y="0"/>
+          <a:ext cx="0" cy="0"/>
+          <a:chOff x="0" y="0"/>
+          <a:chExt cx="0" cy="0"/>
+        </a:xfrm>
+      </p:grpSpPr>
+      <p:sp>
+        <p:nvSpPr>
+          <p:cNvPr id="5" name="object 2"/>
+          <p:cNvSpPr/>
+          <p:nvPr/>
+        </p:nvSpPr>
+        <p:spPr>
+          <a:xfrm>
+            <a:off x="0" y="16565"/>
+            <a:ext cx="13004800" cy="1661795"/>
+          </a:xfrm>
+          <a:custGeom>
+            <a:avLst/>
+            <a:gdLst/>
+            <a:ahLst/>
+            <a:cxnLst/>
+            <a:rect l="l" t="t" r="r" b="b"/>
+            <a:pathLst>
+              <a:path w="13004800" h="1661795">
+                <a:moveTo>
+                  <a:pt x="0" y="1661579"/>
+                </a:moveTo>
+                <a:lnTo>
+                  <a:pt x="0" y="0"/>
+                </a:lnTo>
+                <a:lnTo>
+                  <a:pt x="13004800" y="0"/>
+                </a:lnTo>
+                <a:lnTo>
+                  <a:pt x="13004800" y="1661579"/>
+                </a:lnTo>
+                <a:lnTo>
+                  <a:pt x="0" y="1661579"/>
+                </a:lnTo>
+                <a:close/>
+              </a:path>
+            </a:pathLst>
+          </a:custGeom>
+          <a:solidFill>
+            <a:srgbClr val="CB3D31"/>
+          </a:solidFill>
+        </p:spPr>
+        <p:txBody>
+          <a:bodyPr wrap="square" lIns="0" tIns="0" rIns="0" bIns="0" rtlCol="0"/>
+          <a:lstStyle/>
+          <a:p>
+            <a:endParaRPr/>
+          </a:p>
+        </p:txBody>
+      </p:sp>
+      <p:sp>
+        <p:nvSpPr>
+          <p:cNvPr id="4" name="object 4"/>
+          <p:cNvSpPr txBox="1">
+            <a:spLocks noGrp="1"/>
+          </p:cNvSpPr>
+          <p:nvPr>
+            <p:ph type="title"/>
+          </p:nvPr>
+        </p:nvSpPr>
+        <p:spPr>
+          <a:xfrm>
+            <a:off x="2946400" y="462741"/>
+            <a:ext cx="7112000" cy="769441"/>
+          </a:xfrm>
+          <a:prstGeom prst="rect">
+            <a:avLst/>
+          </a:prstGeom>
+        </p:spPr>
+        <p:txBody>
+          <a:bodyPr vert="horz" wrap="none" lIns="0" tIns="0" rIns="0" bIns="0" rtlCol="0" anchor="t" anchorCtr="1">
+            <a:spAutoFit/>
+          </a:bodyPr>
+          <a:lstStyle/>
+          <a:p>
+            <a:pPr marL="12700">
+              <a:lnSpc>
+                <a:spcPts val="5995"/>
+              </a:lnSpc>
+            </a:pPr>
+            <a:r>
+              <a:rPr lang="en-US" sz="5000" dirty="0" smtClean="0"/>
+              <a:t>Relative and Absolute File Paths</a:t>
+            </a:r>
+            <a:endParaRPr sz="5000" dirty="0"/>
+          </a:p>
+        </p:txBody>
+      </p:sp>
+      <p:pic>
+        <p:nvPicPr>
+          <p:cNvPr id="2" name="Picture 1"/>
+          <p:cNvPicPr>
+            <a:picLocks noChangeAspect="1"/>
+          </p:cNvPicPr>
+          <p:nvPr/>
+        </p:nvPicPr>
+        <p:blipFill rotWithShape="1">
+          <a:blip r:embed="rId2">
+            <a:extLst>
+              <a:ext uri="{28A0092B-C50C-407E-A947-70E740481C1C}">
+                <a14:useLocalDpi xmlns:a14="http://schemas.microsoft.com/office/drawing/2010/main" val="0"/>
+              </a:ext>
+            </a:extLst>
+          </a:blip>
+          <a:srcRect r="30923"/>
+          <a:stretch/>
+        </p:blipFill>
+        <p:spPr>
+          <a:xfrm>
+            <a:off x="625812" y="4438061"/>
+            <a:ext cx="3810000" cy="3868065"/>
+          </a:xfrm>
+          <a:prstGeom prst="rect">
+            <a:avLst/>
+          </a:prstGeom>
+        </p:spPr>
+      </p:pic>
+      <p:graphicFrame>
+        <p:nvGraphicFramePr>
+          <p:cNvPr id="6" name="Table 5"/>
+          <p:cNvGraphicFramePr>
+            <a:graphicFrameLocks noGrp="1"/>
+          </p:cNvGraphicFramePr>
+          <p:nvPr>
+            <p:extLst>
+              <p:ext uri="{D42A27DB-BD31-4B8C-83A1-F6EECF244321}">
+                <p14:modId xmlns:p14="http://schemas.microsoft.com/office/powerpoint/2010/main" val="904597450"/>
+              </p:ext>
+            </p:extLst>
+          </p:nvPr>
+        </p:nvGraphicFramePr>
+        <p:xfrm>
+          <a:off x="4445000" y="4114800"/>
+          <a:ext cx="7772400" cy="4086632"/>
+        </p:xfrm>
+        <a:graphic>
+          <a:graphicData uri="http://schemas.openxmlformats.org/drawingml/2006/table">
+            <a:tbl>
+              <a:tblPr firstRow="1" bandRow="1">
+                <a:tableStyleId>{5C22544A-7EE6-4342-B048-85BDC9FD1C3A}</a:tableStyleId>
+              </a:tblPr>
+              <a:tblGrid>
+                <a:gridCol w="3200400"/>
+                <a:gridCol w="4572000"/>
+              </a:tblGrid>
+              <a:tr h="366778">
+                <a:tc>
+                  <a:txBody>
+                    <a:bodyPr/>
+                    <a:lstStyle/>
+                    <a:p>
+                      <a:r>
+                        <a:rPr lang="en-US" b="1" i="0" dirty="0" smtClean="0">
+                          <a:latin typeface="Bebas Neue" charset="0"/>
+                          <a:ea typeface="Bebas Neue" charset="0"/>
+                          <a:cs typeface="Bebas Neue" charset="0"/>
+                        </a:rPr>
+                        <a:t>Relative</a:t>
+                      </a:r>
+                      <a:endParaRPr lang="en-US" b="1" i="0" dirty="0">
+                        <a:latin typeface="Bebas Neue" charset="0"/>
+                        <a:ea typeface="Bebas Neue" charset="0"/>
+                        <a:cs typeface="Bebas Neue" charset="0"/>
+                      </a:endParaRPr>
+                    </a:p>
+                  </a:txBody>
+                  <a:tcPr>
+                    <a:lnB w="38100" cmpd="sng">
+                      <a:noFill/>
+                    </a:lnB>
+                    <a:solidFill>
+                      <a:srgbClr val="CB3D30"/>
+                    </a:solidFill>
+                  </a:tcPr>
+                </a:tc>
+                <a:tc>
+                  <a:txBody>
+                    <a:bodyPr/>
+                    <a:lstStyle/>
+                    <a:p>
+                      <a:r>
+                        <a:rPr lang="en-US" b="1" i="0" dirty="0" smtClean="0">
+                          <a:latin typeface="Bebas Neue" charset="0"/>
+                          <a:ea typeface="Bebas Neue" charset="0"/>
+                          <a:cs typeface="Bebas Neue" charset="0"/>
+                        </a:rPr>
+                        <a:t>Absolute</a:t>
+                      </a:r>
+                      <a:endParaRPr lang="en-US" b="1" i="0" dirty="0">
+                        <a:latin typeface="Bebas Neue" charset="0"/>
+                        <a:ea typeface="Bebas Neue" charset="0"/>
+                        <a:cs typeface="Bebas Neue" charset="0"/>
+                      </a:endParaRPr>
+                    </a:p>
+                  </a:txBody>
+                  <a:tcPr>
+                    <a:lnB w="38100" cmpd="sng">
+                      <a:noFill/>
+                    </a:lnB>
+                    <a:solidFill>
+                      <a:srgbClr val="CB3D30"/>
+                    </a:solidFill>
+                  </a:tcPr>
+                </a:tc>
+              </a:tr>
+              <a:tr h="339067">
+                <a:tc>
+                  <a:txBody>
+                    <a:bodyPr/>
+                    <a:lstStyle/>
+                    <a:p>
+                      <a:r>
+                        <a:rPr lang="en-US" sz="1600" spc="0" dirty="0" smtClean="0">
+                          <a:latin typeface="Lucida Grande" charset="0"/>
+                          <a:ea typeface="Lucida Grande" charset="0"/>
+                          <a:cs typeface="Lucida Grande" charset="0"/>
+                        </a:rPr>
+                        <a:t>../../</a:t>
+                      </a:r>
+                      <a:r>
+                        <a:rPr lang="en-US" sz="1600" spc="0" dirty="0" err="1" smtClean="0">
+                          <a:latin typeface="Lucida Grande" charset="0"/>
+                          <a:ea typeface="Lucida Grande" charset="0"/>
+                          <a:cs typeface="Lucida Grande" charset="0"/>
+                        </a:rPr>
+                        <a:t>css</a:t>
+                      </a:r>
+                      <a:endParaRPr lang="en-US" sz="1600" spc="0" dirty="0">
+                        <a:latin typeface="Lucida Grande" charset="0"/>
+                        <a:ea typeface="Lucida Grande" charset="0"/>
+                        <a:cs typeface="Lucida Grande" charset="0"/>
+                      </a:endParaRPr>
+                    </a:p>
+                  </a:txBody>
+                  <a:tcPr marL="0" marR="0" marT="0" marB="0" anchor="ctr">
+                    <a:lnL w="12700" cmpd="sng">
+                      <a:noFill/>
+                    </a:lnL>
+                    <a:lnR w="12700" cmpd="sng">
+                      <a:noFill/>
+                    </a:lnR>
+                    <a:lnT w="38100" cmpd="sng">
+                      <a:noFill/>
+                    </a:lnT>
+                    <a:lnB w="12700" cmpd="sng">
+                      <a:noFill/>
+                    </a:lnB>
+                    <a:lnTlToBr w="12700" cmpd="sng">
+                      <a:noFill/>
+                      <a:prstDash val="solid"/>
+                    </a:lnTlToBr>
+                    <a:lnBlToTr w="12700" cmpd="sng">
+                      <a:noFill/>
+                      <a:prstDash val="solid"/>
+                    </a:lnBlToTr>
+                    <a:solidFill>
+                      <a:srgbClr val="F5F5F5"/>
+                    </a:solidFill>
+                  </a:tcPr>
+                </a:tc>
+                <a:tc>
+                  <a:txBody>
+                    <a:bodyPr/>
+                    <a:lstStyle/>
+                    <a:p>
+                      <a:r>
+                        <a:rPr lang="en-US" sz="1600" spc="0" dirty="0" smtClean="0">
+                          <a:latin typeface="Lucida Grande" charset="0"/>
+                          <a:ea typeface="Lucida Grande" charset="0"/>
+                          <a:cs typeface="Lucida Grande" charset="0"/>
+                        </a:rPr>
+                        <a:t>/svc-class-jan-2018/</a:t>
+                      </a:r>
+                      <a:r>
+                        <a:rPr lang="en-US" sz="1600" spc="0" dirty="0" err="1" smtClean="0">
+                          <a:latin typeface="Lucida Grande" charset="0"/>
+                          <a:ea typeface="Lucida Grande" charset="0"/>
+                          <a:cs typeface="Lucida Grande" charset="0"/>
+                        </a:rPr>
+                        <a:t>css</a:t>
+                      </a:r>
+                      <a:endParaRPr lang="en-US" sz="1600" spc="0" dirty="0">
+                        <a:latin typeface="Lucida Grande" charset="0"/>
+                        <a:ea typeface="Lucida Grande" charset="0"/>
+                        <a:cs typeface="Lucida Grande" charset="0"/>
+                      </a:endParaRPr>
+                    </a:p>
+                  </a:txBody>
+                  <a:tcPr marL="0" marR="0" marT="0" marB="0" anchor="ctr">
+                    <a:lnL w="12700" cmpd="sng">
+                      <a:noFill/>
+                    </a:lnL>
+                    <a:lnR w="12700" cmpd="sng">
+                      <a:noFill/>
+                    </a:lnR>
+                    <a:lnT w="38100" cmpd="sng">
+                      <a:noFill/>
+                    </a:lnT>
+                    <a:lnB w="12700" cmpd="sng">
+                      <a:noFill/>
+                    </a:lnB>
+                    <a:lnTlToBr w="12700" cmpd="sng">
+                      <a:noFill/>
+                      <a:prstDash val="solid"/>
+                    </a:lnTlToBr>
+                    <a:lnBlToTr w="12700" cmpd="sng">
+                      <a:noFill/>
+                      <a:prstDash val="solid"/>
+                    </a:lnBlToTr>
+                    <a:solidFill>
+                      <a:srgbClr val="F5F5F5"/>
+                    </a:solidFill>
+                  </a:tcPr>
+                </a:tc>
+              </a:tr>
+              <a:tr h="339067">
+                <a:tc>
+                  <a:txBody>
+                    <a:bodyPr/>
+                    <a:lstStyle/>
+                    <a:p>
+                      <a:r>
+                        <a:rPr lang="en-US" sz="1600" spc="0" dirty="0" smtClean="0">
+                          <a:latin typeface="Lucida Grande" charset="0"/>
+                          <a:ea typeface="Lucida Grande" charset="0"/>
+                          <a:cs typeface="Lucida Grande" charset="0"/>
+                        </a:rPr>
+                        <a:t>../../demos</a:t>
+                      </a:r>
+                      <a:endParaRPr lang="en-US" sz="1600" spc="0" dirty="0">
+                        <a:latin typeface="Lucida Grande" charset="0"/>
+                        <a:ea typeface="Lucida Grande" charset="0"/>
+                        <a:cs typeface="Lucida Grande" charset="0"/>
+                      </a:endParaRPr>
+                    </a:p>
+                  </a:txBody>
+                  <a:tcPr marL="0" marR="0" marT="0" marB="0" anchor="ctr">
+                    <a:lnL w="12700" cmpd="sng">
+                      <a:noFill/>
+                    </a:lnL>
+                    <a:lnR w="12700" cmpd="sng">
+                      <a:noFill/>
+                    </a:lnR>
+                    <a:lnT w="12700" cmpd="sng">
+                      <a:noFill/>
+                    </a:lnT>
+                    <a:lnB w="12700" cmpd="sng">
+                      <a:noFill/>
+                    </a:lnB>
+                    <a:lnTlToBr w="12700" cmpd="sng">
+                      <a:noFill/>
+                      <a:prstDash val="solid"/>
+                    </a:lnTlToBr>
+                    <a:lnBlToTr w="12700" cmpd="sng">
+                      <a:noFill/>
+                      <a:prstDash val="solid"/>
+                    </a:lnBlToTr>
+                    <a:noFill/>
+                  </a:tcPr>
+                </a:tc>
+                <a:tc>
+                  <a:txBody>
+                    <a:bodyPr/>
+                    <a:lstStyle/>
+                    <a:p>
+                      <a:r>
+                        <a:rPr lang="en-US" sz="1600" spc="0" dirty="0" smtClean="0">
+                          <a:latin typeface="Lucida Grande" charset="0"/>
+                          <a:ea typeface="Lucida Grande" charset="0"/>
+                          <a:cs typeface="Lucida Grande" charset="0"/>
+                        </a:rPr>
+                        <a:t>/svc-class-jan-2018/demos</a:t>
+                      </a:r>
+                      <a:endParaRPr lang="en-US" sz="1600" spc="0" dirty="0">
+                        <a:latin typeface="Lucida Grande" charset="0"/>
+                        <a:ea typeface="Lucida Grande" charset="0"/>
+                        <a:cs typeface="Lucida Grande" charset="0"/>
+                      </a:endParaRPr>
+                    </a:p>
+                  </a:txBody>
+                  <a:tcPr marL="0" marR="0" marT="0" marB="0" anchor="ctr">
+                    <a:lnL w="12700" cmpd="sng">
+                      <a:noFill/>
+                    </a:lnL>
+                    <a:lnR w="12700" cmpd="sng">
+                      <a:noFill/>
+                    </a:lnR>
+                    <a:lnT w="12700" cmpd="sng">
+                      <a:noFill/>
+                    </a:lnT>
+                    <a:lnB w="12700" cmpd="sng">
+                      <a:noFill/>
+                    </a:lnB>
+                    <a:lnTlToBr w="12700" cmpd="sng">
+                      <a:noFill/>
+                      <a:prstDash val="solid"/>
+                    </a:lnTlToBr>
+                    <a:lnBlToTr w="12700" cmpd="sng">
+                      <a:noFill/>
+                      <a:prstDash val="solid"/>
+                    </a:lnBlToTr>
+                    <a:noFill/>
+                  </a:tcPr>
+                </a:tc>
+              </a:tr>
+              <a:tr h="339067">
+                <a:tc>
+                  <a:txBody>
+                    <a:bodyPr/>
+                    <a:lstStyle/>
+                    <a:p>
+                      <a:r>
+                        <a:rPr lang="en-US" sz="1600" spc="0" dirty="0" smtClean="0">
+                          <a:latin typeface="Lucida Grande" charset="0"/>
+                          <a:ea typeface="Lucida Grande" charset="0"/>
+                          <a:cs typeface="Lucida Grande" charset="0"/>
+                        </a:rPr>
+                        <a:t>../../</a:t>
+                      </a:r>
+                      <a:r>
+                        <a:rPr lang="en-US" sz="1600" spc="0" dirty="0" err="1" smtClean="0">
+                          <a:latin typeface="Lucida Grande" charset="0"/>
+                          <a:ea typeface="Lucida Grande" charset="0"/>
+                          <a:cs typeface="Lucida Grande" charset="0"/>
+                        </a:rPr>
+                        <a:t>favicon.ico</a:t>
+                      </a:r>
+                      <a:endParaRPr lang="en-US" sz="1600" spc="0" dirty="0">
+                        <a:latin typeface="Lucida Grande" charset="0"/>
+                        <a:ea typeface="Lucida Grande" charset="0"/>
+                        <a:cs typeface="Lucida Grande" charset="0"/>
+                      </a:endParaRPr>
+                    </a:p>
+                  </a:txBody>
+                  <a:tcPr marL="0" marR="0" marT="0" marB="0" anchor="ctr">
+                    <a:lnL w="12700" cmpd="sng">
+                      <a:noFill/>
+                    </a:lnL>
+                    <a:lnR w="12700" cmpd="sng">
+                      <a:noFill/>
+                    </a:lnR>
+                    <a:lnT w="12700" cmpd="sng">
+                      <a:noFill/>
+                    </a:lnT>
+                    <a:lnB w="12700" cmpd="sng">
+                      <a:noFill/>
+                    </a:lnB>
+                    <a:lnTlToBr w="12700" cmpd="sng">
+                      <a:noFill/>
+                      <a:prstDash val="solid"/>
+                    </a:lnTlToBr>
+                    <a:lnBlToTr w="12700" cmpd="sng">
+                      <a:noFill/>
+                      <a:prstDash val="solid"/>
+                    </a:lnBlToTr>
+                    <a:solidFill>
+                      <a:srgbClr val="F5F5F5"/>
+                    </a:solidFill>
+                  </a:tcPr>
+                </a:tc>
+                <a:tc>
+                  <a:txBody>
+                    <a:bodyPr/>
+                    <a:lstStyle/>
+                    <a:p>
+                      <a:r>
+                        <a:rPr lang="en-US" sz="1600" spc="0" dirty="0" smtClean="0">
+                          <a:latin typeface="Lucida Grande" charset="0"/>
+                          <a:ea typeface="Lucida Grande" charset="0"/>
+                          <a:cs typeface="Lucida Grande" charset="0"/>
+                        </a:rPr>
+                        <a:t>/svc-class-jan-2018/</a:t>
+                      </a:r>
+                      <a:r>
+                        <a:rPr lang="en-US" sz="1600" spc="0" dirty="0" err="1" smtClean="0">
+                          <a:latin typeface="Lucida Grande" charset="0"/>
+                          <a:ea typeface="Lucida Grande" charset="0"/>
+                          <a:cs typeface="Lucida Grande" charset="0"/>
+                        </a:rPr>
+                        <a:t>favicon.ico</a:t>
+                      </a:r>
+                      <a:endParaRPr lang="en-US" sz="1600" spc="0" dirty="0">
+                        <a:latin typeface="Lucida Grande" charset="0"/>
+                        <a:ea typeface="Lucida Grande" charset="0"/>
+                        <a:cs typeface="Lucida Grande" charset="0"/>
+                      </a:endParaRPr>
+                    </a:p>
+                  </a:txBody>
+                  <a:tcPr marL="0" marR="0" marT="0" marB="0" anchor="ctr">
+                    <a:lnL w="12700" cmpd="sng">
+                      <a:noFill/>
+                    </a:lnL>
+                    <a:lnR w="12700" cmpd="sng">
+                      <a:noFill/>
+                    </a:lnR>
+                    <a:lnT w="12700" cmpd="sng">
+                      <a:noFill/>
+                    </a:lnT>
+                    <a:lnB w="12700" cmpd="sng">
+                      <a:noFill/>
+                    </a:lnB>
+                    <a:lnTlToBr w="12700" cmpd="sng">
+                      <a:noFill/>
+                      <a:prstDash val="solid"/>
+                    </a:lnTlToBr>
+                    <a:lnBlToTr w="12700" cmpd="sng">
+                      <a:noFill/>
+                      <a:prstDash val="solid"/>
+                    </a:lnBlToTr>
+                    <a:solidFill>
+                      <a:srgbClr val="F5F5F5"/>
+                    </a:solidFill>
+                  </a:tcPr>
+                </a:tc>
+              </a:tr>
+              <a:tr h="339067">
+                <a:tc>
+                  <a:txBody>
+                    <a:bodyPr/>
+                    <a:lstStyle/>
+                    <a:p>
+                      <a:r>
+                        <a:rPr lang="en-US" sz="1600" spc="0" dirty="0" smtClean="0">
+                          <a:latin typeface="Lucida Grande" charset="0"/>
+                          <a:ea typeface="Lucida Grande" charset="0"/>
+                          <a:cs typeface="Lucida Grande" charset="0"/>
+                        </a:rPr>
+                        <a:t>../../fonts</a:t>
+                      </a:r>
+                      <a:endParaRPr lang="en-US" sz="1600" spc="0" dirty="0">
+                        <a:latin typeface="Lucida Grande" charset="0"/>
+                        <a:ea typeface="Lucida Grande" charset="0"/>
+                        <a:cs typeface="Lucida Grande" charset="0"/>
+                      </a:endParaRPr>
+                    </a:p>
+                  </a:txBody>
+                  <a:tcPr marL="0" marR="0" marT="0" marB="0" anchor="ctr">
+                    <a:lnL w="12700" cmpd="sng">
+                      <a:noFill/>
+                    </a:lnL>
+                    <a:lnR w="12700" cmpd="sng">
+                      <a:noFill/>
+                    </a:lnR>
+                    <a:lnT w="12700" cmpd="sng">
+                      <a:noFill/>
+                    </a:lnT>
+                    <a:lnB w="12700" cmpd="sng">
+                      <a:noFill/>
+                    </a:lnB>
+                    <a:lnTlToBr w="12700" cmpd="sng">
+                      <a:noFill/>
+                      <a:prstDash val="solid"/>
+                    </a:lnTlToBr>
+                    <a:lnBlToTr w="12700" cmpd="sng">
+                      <a:noFill/>
+                      <a:prstDash val="solid"/>
+                    </a:lnBlToTr>
+                    <a:noFill/>
+                  </a:tcPr>
+                </a:tc>
+                <a:tc>
+                  <a:txBody>
+                    <a:bodyPr/>
+                    <a:lstStyle/>
+                    <a:p>
+                      <a:r>
+                        <a:rPr lang="en-US" sz="1600" spc="0" dirty="0" smtClean="0">
+                          <a:latin typeface="Lucida Grande" charset="0"/>
+                          <a:ea typeface="Lucida Grande" charset="0"/>
+                          <a:cs typeface="Lucida Grande" charset="0"/>
+                        </a:rPr>
+                        <a:t>/svc-class-jan-2018/fonts</a:t>
+                      </a:r>
+                      <a:endParaRPr lang="en-US" sz="1600" spc="0" dirty="0">
+                        <a:latin typeface="Lucida Grande" charset="0"/>
+                        <a:ea typeface="Lucida Grande" charset="0"/>
+                        <a:cs typeface="Lucida Grande" charset="0"/>
+                      </a:endParaRPr>
+                    </a:p>
+                  </a:txBody>
+                  <a:tcPr marL="0" marR="0" marT="0" marB="0" anchor="ctr">
+                    <a:lnL w="12700" cmpd="sng">
+                      <a:noFill/>
+                    </a:lnL>
+                    <a:lnR w="12700" cmpd="sng">
+                      <a:noFill/>
+                    </a:lnR>
+                    <a:lnT w="12700" cmpd="sng">
+                      <a:noFill/>
+                    </a:lnT>
+                    <a:lnB w="12700" cmpd="sng">
+                      <a:noFill/>
+                    </a:lnB>
+                    <a:lnTlToBr w="12700" cmpd="sng">
+                      <a:noFill/>
+                      <a:prstDash val="solid"/>
+                    </a:lnTlToBr>
+                    <a:lnBlToTr w="12700" cmpd="sng">
+                      <a:noFill/>
+                      <a:prstDash val="solid"/>
+                    </a:lnBlToTr>
+                    <a:noFill/>
+                  </a:tcPr>
+                </a:tc>
+              </a:tr>
+              <a:tr h="339067">
+                <a:tc>
+                  <a:txBody>
+                    <a:bodyPr/>
+                    <a:lstStyle/>
+                    <a:p>
+                      <a:r>
+                        <a:rPr lang="en-US" sz="1600" spc="0" dirty="0" smtClean="0">
+                          <a:latin typeface="Lucida Grande" charset="0"/>
+                          <a:ea typeface="Lucida Grande" charset="0"/>
+                          <a:cs typeface="Lucida Grande" charset="0"/>
+                        </a:rPr>
+                        <a:t>../../html-</a:t>
+                      </a:r>
+                      <a:r>
+                        <a:rPr lang="en-US" sz="1600" spc="0" dirty="0" err="1" smtClean="0">
+                          <a:latin typeface="Lucida Grande" charset="0"/>
+                          <a:ea typeface="Lucida Grande" charset="0"/>
+                          <a:cs typeface="Lucida Grande" charset="0"/>
+                        </a:rPr>
+                        <a:t>css</a:t>
+                      </a:r>
+                      <a:r>
+                        <a:rPr lang="en-US" sz="1600" spc="0" dirty="0" smtClean="0">
+                          <a:latin typeface="Lucida Grande" charset="0"/>
+                          <a:ea typeface="Lucida Grande" charset="0"/>
+                          <a:cs typeface="Lucida Grande" charset="0"/>
+                        </a:rPr>
+                        <a:t>-build-</a:t>
+                      </a:r>
+                      <a:r>
+                        <a:rPr lang="en-US" sz="1600" spc="0" dirty="0" err="1" smtClean="0">
+                          <a:latin typeface="Lucida Grande" charset="0"/>
+                          <a:ea typeface="Lucida Grande" charset="0"/>
+                          <a:cs typeface="Lucida Grande" charset="0"/>
+                        </a:rPr>
+                        <a:t>website.gif</a:t>
+                      </a:r>
+                      <a:endParaRPr lang="en-US" sz="1600" spc="0" dirty="0">
+                        <a:latin typeface="Lucida Grande" charset="0"/>
+                        <a:ea typeface="Lucida Grande" charset="0"/>
+                        <a:cs typeface="Lucida Grande" charset="0"/>
+                      </a:endParaRPr>
+                    </a:p>
+                  </a:txBody>
+                  <a:tcPr marL="0" marR="0" marT="0" marB="0" anchor="ctr">
+                    <a:lnL w="12700" cmpd="sng">
+                      <a:noFill/>
+                    </a:lnL>
+                    <a:lnR w="12700" cmpd="sng">
+                      <a:noFill/>
+                    </a:lnR>
+                    <a:lnT w="12700" cmpd="sng">
+                      <a:noFill/>
+                    </a:lnT>
+                    <a:lnB w="12700" cmpd="sng">
+                      <a:noFill/>
+                    </a:lnB>
+                    <a:lnTlToBr w="12700" cmpd="sng">
+                      <a:noFill/>
+                      <a:prstDash val="solid"/>
+                    </a:lnTlToBr>
+                    <a:lnBlToTr w="12700" cmpd="sng">
+                      <a:noFill/>
+                      <a:prstDash val="solid"/>
+                    </a:lnBlToTr>
+                    <a:solidFill>
+                      <a:srgbClr val="F5F5F5"/>
+                    </a:solidFill>
+                  </a:tcPr>
+                </a:tc>
+                <a:tc>
+                  <a:txBody>
+                    <a:bodyPr/>
+                    <a:lstStyle/>
+                    <a:p>
+                      <a:r>
+                        <a:rPr lang="en-US" sz="1600" spc="0" dirty="0" smtClean="0">
+                          <a:latin typeface="Lucida Grande" charset="0"/>
+                          <a:ea typeface="Lucida Grande" charset="0"/>
+                          <a:cs typeface="Lucida Grande" charset="0"/>
+                        </a:rPr>
+                        <a:t>/svc-class-jan-2018/html-</a:t>
+                      </a:r>
+                      <a:r>
+                        <a:rPr lang="en-US" sz="1600" spc="0" dirty="0" err="1" smtClean="0">
+                          <a:latin typeface="Lucida Grande" charset="0"/>
+                          <a:ea typeface="Lucida Grande" charset="0"/>
+                          <a:cs typeface="Lucida Grande" charset="0"/>
+                        </a:rPr>
+                        <a:t>css</a:t>
+                      </a:r>
+                      <a:r>
+                        <a:rPr lang="en-US" sz="1600" spc="0" dirty="0" smtClean="0">
+                          <a:latin typeface="Lucida Grande" charset="0"/>
+                          <a:ea typeface="Lucida Grande" charset="0"/>
+                          <a:cs typeface="Lucida Grande" charset="0"/>
+                        </a:rPr>
+                        <a:t>-build-webs</a:t>
+                      </a:r>
+                      <a:r>
+                        <a:rPr lang="mr-IN" sz="1600" spc="0" dirty="0" smtClean="0">
+                          <a:latin typeface="Lucida Grande" charset="0"/>
+                          <a:ea typeface="Lucida Grande" charset="0"/>
+                          <a:cs typeface="Lucida Grande" charset="0"/>
+                        </a:rPr>
+                        <a:t>…</a:t>
+                      </a:r>
+                      <a:endParaRPr lang="en-US" sz="1600" spc="0" dirty="0">
+                        <a:latin typeface="Lucida Grande" charset="0"/>
+                        <a:ea typeface="Lucida Grande" charset="0"/>
+                        <a:cs typeface="Lucida Grande" charset="0"/>
+                      </a:endParaRPr>
+                    </a:p>
+                  </a:txBody>
+                  <a:tcPr marL="0" marR="0" marT="0" marB="0" anchor="ctr">
+                    <a:lnL w="12700" cmpd="sng">
+                      <a:noFill/>
+                    </a:lnL>
+                    <a:lnR w="12700" cmpd="sng">
+                      <a:noFill/>
+                    </a:lnR>
+                    <a:lnT w="12700" cmpd="sng">
+                      <a:noFill/>
+                    </a:lnT>
+                    <a:lnB w="12700" cmpd="sng">
+                      <a:noFill/>
+                    </a:lnB>
+                    <a:lnTlToBr w="12700" cmpd="sng">
+                      <a:noFill/>
+                      <a:prstDash val="solid"/>
+                    </a:lnTlToBr>
+                    <a:lnBlToTr w="12700" cmpd="sng">
+                      <a:noFill/>
+                      <a:prstDash val="solid"/>
+                    </a:lnBlToTr>
+                    <a:solidFill>
+                      <a:srgbClr val="F5F5F5"/>
+                    </a:solidFill>
+                  </a:tcPr>
+                </a:tc>
+              </a:tr>
+              <a:tr h="339067">
+                <a:tc>
+                  <a:txBody>
+                    <a:bodyPr/>
+                    <a:lstStyle/>
+                    <a:p>
+                      <a:r>
+                        <a:rPr lang="en-US" sz="1600" spc="0" dirty="0" smtClean="0">
+                          <a:latin typeface="Lucida Grande" charset="0"/>
+                          <a:ea typeface="Lucida Grande" charset="0"/>
+                          <a:cs typeface="Lucida Grande" charset="0"/>
+                        </a:rPr>
+                        <a:t>../../</a:t>
+                      </a:r>
+                      <a:r>
+                        <a:rPr lang="en-US" sz="1600" spc="0" dirty="0" err="1" smtClean="0">
+                          <a:latin typeface="Lucida Grande" charset="0"/>
+                          <a:ea typeface="Lucida Grande" charset="0"/>
+                          <a:cs typeface="Lucida Grande" charset="0"/>
+                        </a:rPr>
+                        <a:t>index.html</a:t>
+                      </a:r>
+                      <a:endParaRPr lang="en-US" sz="1600" spc="0" dirty="0">
+                        <a:latin typeface="Lucida Grande" charset="0"/>
+                        <a:ea typeface="Lucida Grande" charset="0"/>
+                        <a:cs typeface="Lucida Grande" charset="0"/>
+                      </a:endParaRPr>
+                    </a:p>
+                  </a:txBody>
+                  <a:tcPr marL="0" marR="0" marT="0" marB="0" anchor="ctr">
+                    <a:lnL w="12700" cmpd="sng">
+                      <a:noFill/>
+                    </a:lnL>
+                    <a:lnR w="12700" cmpd="sng">
+                      <a:noFill/>
+                    </a:lnR>
+                    <a:lnT w="12700" cmpd="sng">
+                      <a:noFill/>
+                    </a:lnT>
+                    <a:lnB w="12700" cmpd="sng">
+                      <a:noFill/>
+                    </a:lnB>
+                    <a:lnTlToBr w="12700" cmpd="sng">
+                      <a:noFill/>
+                      <a:prstDash val="solid"/>
+                    </a:lnTlToBr>
+                    <a:lnBlToTr w="12700" cmpd="sng">
+                      <a:noFill/>
+                      <a:prstDash val="solid"/>
+                    </a:lnBlToTr>
+                    <a:noFill/>
+                  </a:tcPr>
+                </a:tc>
+                <a:tc>
+                  <a:txBody>
+                    <a:bodyPr/>
+                    <a:lstStyle/>
+                    <a:p>
+                      <a:r>
+                        <a:rPr lang="en-US" sz="1600" spc="0" dirty="0" smtClean="0">
+                          <a:latin typeface="Lucida Grande" charset="0"/>
+                          <a:ea typeface="Lucida Grande" charset="0"/>
+                          <a:cs typeface="Lucida Grande" charset="0"/>
+                        </a:rPr>
+                        <a:t>/svc-class-jan-2018/</a:t>
+                      </a:r>
+                      <a:r>
+                        <a:rPr lang="en-US" sz="1600" spc="0" dirty="0" err="1" smtClean="0">
+                          <a:latin typeface="Lucida Grande" charset="0"/>
+                          <a:ea typeface="Lucida Grande" charset="0"/>
+                          <a:cs typeface="Lucida Grande" charset="0"/>
+                        </a:rPr>
+                        <a:t>index.html</a:t>
+                      </a:r>
+                      <a:endParaRPr lang="en-US" sz="1600" spc="0" dirty="0">
+                        <a:latin typeface="Lucida Grande" charset="0"/>
+                        <a:ea typeface="Lucida Grande" charset="0"/>
+                        <a:cs typeface="Lucida Grande" charset="0"/>
+                      </a:endParaRPr>
+                    </a:p>
+                  </a:txBody>
+                  <a:tcPr marL="0" marR="0" marT="0" marB="0" anchor="ctr">
+                    <a:lnL w="12700" cmpd="sng">
+                      <a:noFill/>
+                    </a:lnL>
+                    <a:lnR w="12700" cmpd="sng">
+                      <a:noFill/>
+                    </a:lnR>
+                    <a:lnT w="12700" cmpd="sng">
+                      <a:noFill/>
+                    </a:lnT>
+                    <a:lnB w="12700" cmpd="sng">
+                      <a:noFill/>
+                    </a:lnB>
+                    <a:lnTlToBr w="12700" cmpd="sng">
+                      <a:noFill/>
+                      <a:prstDash val="solid"/>
+                    </a:lnTlToBr>
+                    <a:lnBlToTr w="12700" cmpd="sng">
+                      <a:noFill/>
+                      <a:prstDash val="solid"/>
+                    </a:lnBlToTr>
+                    <a:noFill/>
+                  </a:tcPr>
+                </a:tc>
+              </a:tr>
+              <a:tr h="339067">
+                <a:tc>
+                  <a:txBody>
+                    <a:bodyPr/>
+                    <a:lstStyle/>
+                    <a:p>
+                      <a:r>
+                        <a:rPr lang="en-US" sz="1600" spc="0" dirty="0" smtClean="0">
+                          <a:latin typeface="Lucida Grande" charset="0"/>
+                          <a:ea typeface="Lucida Grande" charset="0"/>
+                          <a:cs typeface="Lucida Grande" charset="0"/>
+                        </a:rPr>
+                        <a:t>../../</a:t>
+                      </a:r>
+                      <a:r>
+                        <a:rPr lang="en-US" sz="1600" spc="0" dirty="0" err="1" smtClean="0">
+                          <a:latin typeface="Lucida Grande" charset="0"/>
+                          <a:ea typeface="Lucida Grande" charset="0"/>
+                          <a:cs typeface="Lucida Grande" charset="0"/>
+                        </a:rPr>
+                        <a:t>README.md</a:t>
+                      </a:r>
+                      <a:endParaRPr lang="en-US" sz="1600" spc="0" dirty="0">
+                        <a:latin typeface="Lucida Grande" charset="0"/>
+                        <a:ea typeface="Lucida Grande" charset="0"/>
+                        <a:cs typeface="Lucida Grande" charset="0"/>
+                      </a:endParaRPr>
+                    </a:p>
+                  </a:txBody>
+                  <a:tcPr marL="0" marR="0" marT="0" marB="0" anchor="ctr">
+                    <a:lnL w="12700" cmpd="sng">
+                      <a:noFill/>
+                    </a:lnL>
+                    <a:lnR w="12700" cmpd="sng">
+                      <a:noFill/>
+                    </a:lnR>
+                    <a:lnT w="12700" cmpd="sng">
+                      <a:noFill/>
+                    </a:lnT>
+                    <a:lnB w="12700" cmpd="sng">
+                      <a:noFill/>
+                    </a:lnB>
+                    <a:lnTlToBr w="12700" cmpd="sng">
+                      <a:noFill/>
+                      <a:prstDash val="solid"/>
+                    </a:lnTlToBr>
+                    <a:lnBlToTr w="12700" cmpd="sng">
+                      <a:noFill/>
+                      <a:prstDash val="solid"/>
+                    </a:lnBlToTr>
+                    <a:solidFill>
+                      <a:srgbClr val="F5F5F5"/>
+                    </a:solidFill>
+                  </a:tcPr>
+                </a:tc>
+                <a:tc>
+                  <a:txBody>
+                    <a:bodyPr/>
+                    <a:lstStyle/>
+                    <a:p>
+                      <a:r>
+                        <a:rPr lang="en-US" sz="1600" spc="0" dirty="0" smtClean="0">
+                          <a:latin typeface="Lucida Grande" charset="0"/>
+                          <a:ea typeface="Lucida Grande" charset="0"/>
+                          <a:cs typeface="Lucida Grande" charset="0"/>
+                        </a:rPr>
+                        <a:t>/svc-class-jan-2018/</a:t>
+                      </a:r>
+                      <a:r>
+                        <a:rPr lang="en-US" sz="1600" spc="0" dirty="0" err="1" smtClean="0">
+                          <a:latin typeface="Lucida Grande" charset="0"/>
+                          <a:ea typeface="Lucida Grande" charset="0"/>
+                          <a:cs typeface="Lucida Grande" charset="0"/>
+                        </a:rPr>
+                        <a:t>README.md</a:t>
+                      </a:r>
+                      <a:endParaRPr lang="en-US" sz="1600" spc="0" dirty="0">
+                        <a:latin typeface="Lucida Grande" charset="0"/>
+                        <a:ea typeface="Lucida Grande" charset="0"/>
+                        <a:cs typeface="Lucida Grande" charset="0"/>
+                      </a:endParaRPr>
+                    </a:p>
+                  </a:txBody>
+                  <a:tcPr marL="0" marR="0" marT="0" marB="0" anchor="ctr">
+                    <a:lnL w="12700" cmpd="sng">
+                      <a:noFill/>
+                    </a:lnL>
+                    <a:lnR w="12700" cmpd="sng">
+                      <a:noFill/>
+                    </a:lnR>
+                    <a:lnT w="12700" cmpd="sng">
+                      <a:noFill/>
+                    </a:lnT>
+                    <a:lnB w="12700" cmpd="sng">
+                      <a:noFill/>
+                    </a:lnB>
+                    <a:lnTlToBr w="12700" cmpd="sng">
+                      <a:noFill/>
+                      <a:prstDash val="solid"/>
+                    </a:lnTlToBr>
+                    <a:lnBlToTr w="12700" cmpd="sng">
+                      <a:noFill/>
+                      <a:prstDash val="solid"/>
+                    </a:lnBlToTr>
+                    <a:solidFill>
+                      <a:srgbClr val="F5F5F5"/>
+                    </a:solidFill>
+                  </a:tcPr>
+                </a:tc>
+              </a:tr>
+              <a:tr h="339067">
+                <a:tc>
+                  <a:txBody>
+                    <a:bodyPr/>
+                    <a:lstStyle/>
+                    <a:p>
+                      <a:r>
+                        <a:rPr lang="en-US" sz="1600" spc="0" dirty="0" smtClean="0">
+                          <a:latin typeface="Lucida Grande" charset="0"/>
+                          <a:ea typeface="Lucida Grande" charset="0"/>
+                          <a:cs typeface="Lucida Grande" charset="0"/>
+                        </a:rPr>
+                        <a:t>../../slides</a:t>
+                      </a:r>
+                      <a:endParaRPr lang="en-US" sz="1600" spc="0" dirty="0">
+                        <a:latin typeface="Lucida Grande" charset="0"/>
+                        <a:ea typeface="Lucida Grande" charset="0"/>
+                        <a:cs typeface="Lucida Grande" charset="0"/>
+                      </a:endParaRPr>
+                    </a:p>
+                  </a:txBody>
+                  <a:tcPr marL="0" marR="0" marT="0" marB="0" anchor="ctr">
+                    <a:lnL w="12700" cmpd="sng">
+                      <a:noFill/>
+                    </a:lnL>
+                    <a:lnR w="12700" cmpd="sng">
+                      <a:noFill/>
+                    </a:lnR>
+                    <a:lnT w="12700" cmpd="sng">
+                      <a:noFill/>
+                    </a:lnT>
+                    <a:lnB w="12700" cmpd="sng">
+                      <a:noFill/>
+                    </a:lnB>
+                    <a:lnTlToBr w="12700" cmpd="sng">
+                      <a:noFill/>
+                      <a:prstDash val="solid"/>
+                    </a:lnTlToBr>
+                    <a:lnBlToTr w="12700" cmpd="sng">
+                      <a:noFill/>
+                      <a:prstDash val="solid"/>
+                    </a:lnBlToTr>
+                    <a:noFill/>
+                  </a:tcPr>
+                </a:tc>
+                <a:tc>
+                  <a:txBody>
+                    <a:bodyPr/>
+                    <a:lstStyle/>
+                    <a:p>
+                      <a:r>
+                        <a:rPr lang="en-US" sz="1600" spc="0" dirty="0" smtClean="0">
+                          <a:latin typeface="Lucida Grande" charset="0"/>
+                          <a:ea typeface="Lucida Grande" charset="0"/>
+                          <a:cs typeface="Lucida Grande" charset="0"/>
+                        </a:rPr>
+                        <a:t>/svc-class-jan-2018/slides</a:t>
+                      </a:r>
+                      <a:endParaRPr lang="en-US" sz="1600" spc="0" dirty="0">
+                        <a:latin typeface="Lucida Grande" charset="0"/>
+                        <a:ea typeface="Lucida Grande" charset="0"/>
+                        <a:cs typeface="Lucida Grande" charset="0"/>
+                      </a:endParaRPr>
+                    </a:p>
+                  </a:txBody>
+                  <a:tcPr marL="0" marR="0" marT="0" marB="0" anchor="ctr">
+                    <a:lnL w="12700" cmpd="sng">
+                      <a:noFill/>
+                    </a:lnL>
+                    <a:lnR w="12700" cmpd="sng">
+                      <a:noFill/>
+                    </a:lnR>
+                    <a:lnT w="12700" cmpd="sng">
+                      <a:noFill/>
+                    </a:lnT>
+                    <a:lnB w="12700" cmpd="sng">
+                      <a:noFill/>
+                    </a:lnB>
+                    <a:lnTlToBr w="12700" cmpd="sng">
+                      <a:noFill/>
+                      <a:prstDash val="solid"/>
+                    </a:lnTlToBr>
+                    <a:lnBlToTr w="12700" cmpd="sng">
+                      <a:noFill/>
+                      <a:prstDash val="solid"/>
+                    </a:lnBlToTr>
+                    <a:noFill/>
+                  </a:tcPr>
+                </a:tc>
+              </a:tr>
+              <a:tr h="339067">
+                <a:tc>
+                  <a:txBody>
+                    <a:bodyPr/>
+                    <a:lstStyle/>
+                    <a:p>
+                      <a:r>
+                        <a:rPr lang="en-US" sz="1600" spc="0" dirty="0" smtClean="0">
+                          <a:latin typeface="Lucida Grande" charset="0"/>
+                          <a:ea typeface="Lucida Grande" charset="0"/>
+                          <a:cs typeface="Lucida Grande" charset="0"/>
+                        </a:rPr>
+                        <a:t>../</a:t>
+                      </a:r>
+                      <a:endParaRPr lang="en-US" sz="1600" spc="0" dirty="0">
+                        <a:latin typeface="Lucida Grande" charset="0"/>
+                        <a:ea typeface="Lucida Grande" charset="0"/>
+                        <a:cs typeface="Lucida Grande" charset="0"/>
+                      </a:endParaRPr>
+                    </a:p>
+                  </a:txBody>
+                  <a:tcPr marL="0" marR="0" marT="0" marB="0" anchor="ctr">
+                    <a:lnL w="12700" cmpd="sng">
+                      <a:noFill/>
+                    </a:lnL>
+                    <a:lnR w="12700" cmpd="sng">
+                      <a:noFill/>
+                    </a:lnR>
+                    <a:lnT w="12700" cmpd="sng">
+                      <a:noFill/>
+                    </a:lnT>
+                    <a:lnB w="12700" cmpd="sng">
+                      <a:noFill/>
+                    </a:lnB>
+                    <a:lnTlToBr w="12700" cmpd="sng">
+                      <a:noFill/>
+                      <a:prstDash val="solid"/>
+                    </a:lnTlToBr>
+                    <a:lnBlToTr w="12700" cmpd="sng">
+                      <a:noFill/>
+                      <a:prstDash val="solid"/>
+                    </a:lnBlToTr>
+                    <a:solidFill>
+                      <a:srgbClr val="F5F5F5"/>
+                    </a:solidFill>
+                  </a:tcPr>
+                </a:tc>
+                <a:tc>
+                  <a:txBody>
+                    <a:bodyPr/>
+                    <a:lstStyle/>
+                    <a:p>
+                      <a:r>
+                        <a:rPr lang="en-US" sz="1600" spc="0" dirty="0" smtClean="0">
+                          <a:latin typeface="Lucida Grande" charset="0"/>
+                          <a:ea typeface="Lucida Grande" charset="0"/>
+                          <a:cs typeface="Lucida Grande" charset="0"/>
+                        </a:rPr>
+                        <a:t>/svc-class-jan-2018/students</a:t>
+                      </a:r>
+                      <a:endParaRPr lang="en-US" sz="1600" spc="0" dirty="0">
+                        <a:latin typeface="Lucida Grande" charset="0"/>
+                        <a:ea typeface="Lucida Grande" charset="0"/>
+                        <a:cs typeface="Lucida Grande" charset="0"/>
+                      </a:endParaRPr>
+                    </a:p>
+                  </a:txBody>
+                  <a:tcPr marL="0" marR="0" marT="0" marB="0" anchor="ctr">
+                    <a:lnL w="12700" cmpd="sng">
+                      <a:noFill/>
+                    </a:lnL>
+                    <a:lnR w="12700" cmpd="sng">
+                      <a:noFill/>
+                    </a:lnR>
+                    <a:lnT w="12700" cmpd="sng">
+                      <a:noFill/>
+                    </a:lnT>
+                    <a:lnB w="12700" cmpd="sng">
+                      <a:noFill/>
+                    </a:lnB>
+                    <a:lnTlToBr w="12700" cmpd="sng">
+                      <a:noFill/>
+                      <a:prstDash val="solid"/>
+                    </a:lnTlToBr>
+                    <a:lnBlToTr w="12700" cmpd="sng">
+                      <a:noFill/>
+                      <a:prstDash val="solid"/>
+                    </a:lnBlToTr>
+                    <a:solidFill>
+                      <a:srgbClr val="F5F5F5"/>
+                    </a:solidFill>
+                  </a:tcPr>
+                </a:tc>
+              </a:tr>
+              <a:tr h="329184">
+                <a:tc>
+                  <a:txBody>
+                    <a:bodyPr/>
+                    <a:lstStyle/>
+                    <a:p>
+                      <a:r>
+                        <a:rPr lang="en-US" sz="1600" spc="0" dirty="0" smtClean="0">
+                          <a:solidFill>
+                            <a:schemeClr val="bg1"/>
+                          </a:solidFill>
+                          <a:latin typeface="Lucida Grande" charset="0"/>
+                          <a:ea typeface="Lucida Grande" charset="0"/>
+                          <a:cs typeface="Lucida Grande" charset="0"/>
+                        </a:rPr>
+                        <a:t>./</a:t>
+                      </a:r>
+                      <a:endParaRPr lang="en-US" sz="1600" spc="0" dirty="0">
+                        <a:solidFill>
+                          <a:schemeClr val="bg1"/>
+                        </a:solidFill>
+                        <a:latin typeface="Lucida Grande" charset="0"/>
+                        <a:ea typeface="Lucida Grande" charset="0"/>
+                        <a:cs typeface="Lucida Grande" charset="0"/>
+                      </a:endParaRPr>
+                    </a:p>
+                  </a:txBody>
+                  <a:tcPr marL="0" marR="0" marT="0" marB="0" anchor="ctr">
+                    <a:lnL w="12700" cmpd="sng">
+                      <a:noFill/>
+                    </a:lnL>
+                    <a:lnR w="12700" cmpd="sng">
+                      <a:noFill/>
+                    </a:lnR>
+                    <a:lnT w="12700" cmpd="sng">
+                      <a:noFill/>
+                    </a:lnT>
+                    <a:lnB w="12700" cmpd="sng">
+                      <a:noFill/>
+                    </a:lnB>
+                    <a:lnTlToBr w="12700" cmpd="sng">
+                      <a:noFill/>
+                      <a:prstDash val="solid"/>
+                    </a:lnTlToBr>
+                    <a:lnBlToTr w="12700" cmpd="sng">
+                      <a:noFill/>
+                      <a:prstDash val="solid"/>
+                    </a:lnBlToTr>
+                    <a:solidFill>
+                      <a:srgbClr val="0069DA"/>
+                    </a:solidFill>
+                  </a:tcPr>
+                </a:tc>
+                <a:tc>
+                  <a:txBody>
+                    <a:bodyPr/>
+                    <a:lstStyle/>
+                    <a:p>
+                      <a:r>
+                        <a:rPr lang="en-US" sz="1600" spc="0" dirty="0" smtClean="0">
+                          <a:solidFill>
+                            <a:schemeClr val="bg1"/>
+                          </a:solidFill>
+                          <a:latin typeface="Lucida Grande" charset="0"/>
+                          <a:ea typeface="Lucida Grande" charset="0"/>
+                          <a:cs typeface="Lucida Grande" charset="0"/>
+                        </a:rPr>
+                        <a:t>/svc-class-jan-2018/students/example</a:t>
+                      </a:r>
+                      <a:endParaRPr lang="en-US" sz="1600" spc="0" dirty="0">
+                        <a:solidFill>
+                          <a:schemeClr val="bg1"/>
+                        </a:solidFill>
+                        <a:latin typeface="Lucida Grande" charset="0"/>
+                        <a:ea typeface="Lucida Grande" charset="0"/>
+                        <a:cs typeface="Lucida Grande" charset="0"/>
+                      </a:endParaRPr>
+                    </a:p>
+                  </a:txBody>
+                  <a:tcPr marL="0" marR="0" marT="0" marB="0" anchor="ctr">
+                    <a:lnL w="12700" cmpd="sng">
+                      <a:noFill/>
+                    </a:lnL>
+                    <a:lnR w="12700" cmpd="sng">
+                      <a:noFill/>
+                    </a:lnR>
+                    <a:lnT w="12700" cmpd="sng">
+                      <a:noFill/>
+                    </a:lnT>
+                    <a:lnB w="12700" cmpd="sng">
+                      <a:noFill/>
+                    </a:lnB>
+                    <a:lnTlToBr w="12700" cmpd="sng">
+                      <a:noFill/>
+                      <a:prstDash val="solid"/>
+                    </a:lnTlToBr>
+                    <a:lnBlToTr w="12700" cmpd="sng">
+                      <a:noFill/>
+                      <a:prstDash val="solid"/>
+                    </a:lnBlToTr>
+                    <a:solidFill>
+                      <a:srgbClr val="0069DA"/>
+                    </a:solidFill>
+                  </a:tcPr>
+                </a:tc>
+              </a:tr>
+              <a:tr h="339067">
+                <a:tc>
+                  <a:txBody>
+                    <a:bodyPr/>
+                    <a:lstStyle/>
+                    <a:p>
+                      <a:r>
+                        <a:rPr lang="en-US" sz="1600" spc="0" dirty="0" smtClean="0">
+                          <a:latin typeface="Lucida Grande" charset="0"/>
+                          <a:ea typeface="Lucida Grande" charset="0"/>
+                          <a:cs typeface="Lucida Grande" charset="0"/>
+                        </a:rPr>
+                        <a:t>./basic-</a:t>
+                      </a:r>
+                      <a:r>
+                        <a:rPr lang="en-US" sz="1600" spc="0" dirty="0" err="1" smtClean="0">
+                          <a:latin typeface="Lucida Grande" charset="0"/>
+                          <a:ea typeface="Lucida Grande" charset="0"/>
+                          <a:cs typeface="Lucida Grande" charset="0"/>
+                        </a:rPr>
+                        <a:t>page.html</a:t>
+                      </a:r>
+                      <a:endParaRPr lang="en-US" sz="1600" spc="0" dirty="0">
+                        <a:latin typeface="Lucida Grande" charset="0"/>
+                        <a:ea typeface="Lucida Grande" charset="0"/>
+                        <a:cs typeface="Lucida Grande" charset="0"/>
+                      </a:endParaRPr>
+                    </a:p>
+                  </a:txBody>
+                  <a:tcPr marL="0" marR="0" marT="0" marB="0" anchor="ctr">
+                    <a:lnL w="12700" cmpd="sng">
+                      <a:noFill/>
+                    </a:lnL>
+                    <a:lnR w="12700" cmpd="sng">
+                      <a:noFill/>
+                    </a:lnR>
+                    <a:lnT w="12700" cmpd="sng">
+                      <a:noFill/>
+                    </a:lnT>
+                    <a:lnB w="12700" cmpd="sng">
+                      <a:noFill/>
+                    </a:lnB>
+                    <a:lnTlToBr w="12700" cmpd="sng">
+                      <a:noFill/>
+                      <a:prstDash val="solid"/>
+                    </a:lnTlToBr>
+                    <a:lnBlToTr w="12700" cmpd="sng">
+                      <a:noFill/>
+                      <a:prstDash val="solid"/>
+                    </a:lnBlToTr>
+                    <a:solidFill>
+                      <a:srgbClr val="F5F5F5"/>
+                    </a:solidFill>
+                  </a:tcPr>
+                </a:tc>
+                <a:tc>
+                  <a:txBody>
+                    <a:bodyPr/>
+                    <a:lstStyle/>
+                    <a:p>
+                      <a:r>
+                        <a:rPr lang="en-US" sz="1600" spc="0" dirty="0" smtClean="0">
+                          <a:latin typeface="Lucida Grande" charset="0"/>
+                          <a:ea typeface="Lucida Grande" charset="0"/>
+                          <a:cs typeface="Lucida Grande" charset="0"/>
+                        </a:rPr>
+                        <a:t>/svc-class-jan-2018/students/example/</a:t>
+                      </a:r>
+                      <a:r>
+                        <a:rPr lang="en-US" sz="1600" spc="0" dirty="0" err="1" smtClean="0">
+                          <a:latin typeface="Lucida Grande" charset="0"/>
+                          <a:ea typeface="Lucida Grande" charset="0"/>
+                          <a:cs typeface="Lucida Grande" charset="0"/>
+                        </a:rPr>
+                        <a:t>ba</a:t>
+                      </a:r>
+                      <a:r>
+                        <a:rPr lang="mr-IN" sz="1600" spc="0" dirty="0" smtClean="0">
+                          <a:latin typeface="Lucida Grande" charset="0"/>
+                          <a:ea typeface="Lucida Grande" charset="0"/>
+                          <a:cs typeface="Lucida Grande" charset="0"/>
+                        </a:rPr>
+                        <a:t>…</a:t>
+                      </a:r>
+                      <a:endParaRPr lang="en-US" sz="1600" spc="0" dirty="0">
+                        <a:latin typeface="Lucida Grande" charset="0"/>
+                        <a:ea typeface="Lucida Grande" charset="0"/>
+                        <a:cs typeface="Lucida Grande" charset="0"/>
+                      </a:endParaRPr>
+                    </a:p>
+                  </a:txBody>
+                  <a:tcPr marL="0" marR="0" marT="0" marB="0" anchor="ctr">
+                    <a:lnL w="12700" cmpd="sng">
+                      <a:noFill/>
+                    </a:lnL>
+                    <a:lnR w="12700" cmpd="sng">
+                      <a:noFill/>
+                    </a:lnR>
+                    <a:lnT w="12700" cmpd="sng">
+                      <a:noFill/>
+                    </a:lnT>
+                    <a:lnB w="12700" cmpd="sng">
+                      <a:noFill/>
+                    </a:lnB>
+                    <a:lnTlToBr w="12700" cmpd="sng">
+                      <a:noFill/>
+                      <a:prstDash val="solid"/>
+                    </a:lnTlToBr>
+                    <a:lnBlToTr w="12700" cmpd="sng">
+                      <a:noFill/>
+                      <a:prstDash val="solid"/>
+                    </a:lnBlToTr>
+                    <a:solidFill>
+                      <a:srgbClr val="F5F5F5"/>
+                    </a:solidFill>
+                  </a:tcPr>
+                </a:tc>
+              </a:tr>
+            </a:tbl>
+          </a:graphicData>
+        </a:graphic>
+      </p:graphicFrame>
+      <p:sp>
+        <p:nvSpPr>
+          <p:cNvPr id="7" name="Rectangle 6"/>
+          <p:cNvSpPr/>
+          <p:nvPr/>
+        </p:nvSpPr>
+        <p:spPr>
+          <a:xfrm>
+            <a:off x="631216" y="2124536"/>
+            <a:ext cx="11586183" cy="1200329"/>
+          </a:xfrm>
+          <a:prstGeom prst="rect">
+            <a:avLst/>
+          </a:prstGeom>
+        </p:spPr>
+        <p:txBody>
+          <a:bodyPr wrap="square">
+            <a:spAutoFit/>
+          </a:bodyPr>
+          <a:lstStyle/>
+          <a:p>
+            <a:pPr marL="12700" marR="918844">
+              <a:lnSpc>
+                <a:spcPct val="100000"/>
+              </a:lnSpc>
+            </a:pPr>
+            <a:r>
+              <a:rPr lang="en-US" sz="3600" spc="-5" dirty="0" smtClean="0">
+                <a:solidFill>
+                  <a:srgbClr val="5F5F5F"/>
+                </a:solidFill>
+                <a:latin typeface="Georgia"/>
+                <a:cs typeface="Georgia"/>
+              </a:rPr>
+              <a:t>Assuming the project folder is in the root of the drive: “/” on Mac and Linux; “C:\” on Windows</a:t>
+            </a:r>
+            <a:r>
+              <a:rPr lang="mr-IN" sz="3600" spc="-5" dirty="0" smtClean="0">
+                <a:solidFill>
+                  <a:srgbClr val="5F5F5F"/>
+                </a:solidFill>
+                <a:latin typeface="Georgia"/>
+                <a:cs typeface="Georgia"/>
+              </a:rPr>
+              <a:t>…</a:t>
+            </a:r>
+            <a:endParaRPr lang="en-US" sz="3600" dirty="0">
+              <a:latin typeface="Georgia"/>
+              <a:cs typeface="Georgia"/>
+            </a:endParaRPr>
+          </a:p>
+        </p:txBody>
+      </p:sp>
+    </p:spTree>
+    <p:extLst>
+      <p:ext uri="{BB962C8B-B14F-4D97-AF65-F5344CB8AC3E}">
+        <p14:creationId xmlns:p14="http://schemas.microsoft.com/office/powerpoint/2010/main" val="1454399671"/>
+      </p:ext>
+    </p:extLst>
+  </p:cSld>
+  <p:clrMapOvr>
+    <a:masterClrMapping/>
+  </p:clrMapOvr>
+  <p:timing>
+    <p:tnLst>
+      <p:par>
+        <p:cTn id="1" dur="indefinite" restart="never" nodeType="tmRoot"/>
+      </p:par>
+    </p:tnLst>
+  </p:timing>
+</p:sld>
+</file>
+
+<file path=ppt/slides/slide53.xml><?xml version="1.0" encoding="utf-8"?>
 <p:sld xmlns:a="http://schemas.openxmlformats.org/drawingml/2006/main" xmlns:r="http://schemas.openxmlformats.org/officeDocument/2006/relationships" xmlns:p="http://schemas.openxmlformats.org/presentationml/2006/main">
   <p:cSld>
     <p:spTree>
@@ -27104,387 +28899,13 @@
   <p:clrMapOvr>
     <a:masterClrMapping/>
   </p:clrMapOvr>
-</p:sld>
-</file>
-
-<file path=ppt/slides/slide53.xml><?xml version="1.0" encoding="utf-8"?>
-<p:sld xmlns:a="http://schemas.openxmlformats.org/drawingml/2006/main" xmlns:r="http://schemas.openxmlformats.org/officeDocument/2006/relationships" xmlns:p="http://schemas.openxmlformats.org/presentationml/2006/main">
-  <p:cSld>
-    <p:spTree>
-      <p:nvGrpSpPr>
-        <p:cNvPr id="1" name=""/>
-        <p:cNvGrpSpPr/>
-        <p:nvPr/>
-      </p:nvGrpSpPr>
-      <p:grpSpPr>
-        <a:xfrm>
-          <a:off x="0" y="0"/>
-          <a:ext cx="0" cy="0"/>
-          <a:chOff x="0" y="0"/>
-          <a:chExt cx="0" cy="0"/>
-        </a:xfrm>
-      </p:grpSpPr>
-      <p:sp>
-        <p:nvSpPr>
-          <p:cNvPr id="2" name="object 2"/>
-          <p:cNvSpPr/>
-          <p:nvPr/>
-        </p:nvSpPr>
-        <p:spPr>
-          <a:xfrm>
-            <a:off x="0" y="0"/>
-            <a:ext cx="13004800" cy="1661795"/>
-          </a:xfrm>
-          <a:custGeom>
-            <a:avLst/>
-            <a:gdLst/>
-            <a:ahLst/>
-            <a:cxnLst/>
-            <a:rect l="l" t="t" r="r" b="b"/>
-            <a:pathLst>
-              <a:path w="13004800" h="1661795">
-                <a:moveTo>
-                  <a:pt x="0" y="1661579"/>
-                </a:moveTo>
-                <a:lnTo>
-                  <a:pt x="0" y="0"/>
-                </a:lnTo>
-                <a:lnTo>
-                  <a:pt x="13004800" y="0"/>
-                </a:lnTo>
-                <a:lnTo>
-                  <a:pt x="13004800" y="1661579"/>
-                </a:lnTo>
-                <a:lnTo>
-                  <a:pt x="0" y="1661579"/>
-                </a:lnTo>
-                <a:close/>
-              </a:path>
-            </a:pathLst>
-          </a:custGeom>
-          <a:solidFill>
-            <a:srgbClr val="209078"/>
-          </a:solidFill>
-        </p:spPr>
-        <p:txBody>
-          <a:bodyPr wrap="square" lIns="0" tIns="0" rIns="0" bIns="0" rtlCol="0"/>
-          <a:lstStyle/>
-          <a:p>
-            <a:endParaRPr/>
-          </a:p>
-        </p:txBody>
-      </p:sp>
-      <p:sp>
-        <p:nvSpPr>
-          <p:cNvPr id="3" name="object 3"/>
-          <p:cNvSpPr txBox="1"/>
-          <p:nvPr/>
-        </p:nvSpPr>
-        <p:spPr>
-          <a:xfrm>
-            <a:off x="1446847" y="2819400"/>
-            <a:ext cx="9780905" cy="5816977"/>
-          </a:xfrm>
-          <a:prstGeom prst="rect">
-            <a:avLst/>
-          </a:prstGeom>
-        </p:spPr>
-        <p:txBody>
-          <a:bodyPr vert="horz" wrap="square" lIns="0" tIns="0" rIns="0" bIns="0" rtlCol="0">
-            <a:spAutoFit/>
-          </a:bodyPr>
-          <a:lstStyle/>
-          <a:p>
-            <a:pPr>
-              <a:lnSpc>
-                <a:spcPct val="100000"/>
-              </a:lnSpc>
-              <a:buClr>
-                <a:srgbClr val="5F5F5F"/>
-              </a:buClr>
-            </a:pPr>
-            <a:endParaRPr sz="3600" dirty="0">
-              <a:latin typeface="Georgia" panose="02040502050405020303" pitchFamily="18" charset="0"/>
-              <a:cs typeface="Times New Roman"/>
-            </a:endParaRPr>
-          </a:p>
-          <a:p>
-            <a:pPr marL="12700" algn="ctr">
-              <a:lnSpc>
-                <a:spcPct val="100000"/>
-              </a:lnSpc>
-              <a:buSzPct val="74242"/>
-              <a:tabLst>
-                <a:tab pos="445770" algn="l"/>
-                <a:tab pos="446405" algn="l"/>
-              </a:tabLst>
-            </a:pPr>
-            <a:r>
-              <a:rPr lang="en-US" sz="5400" dirty="0">
-                <a:solidFill>
-                  <a:srgbClr val="5F5F5F"/>
-                </a:solidFill>
-                <a:latin typeface="Georgia" panose="02040502050405020303" pitchFamily="18" charset="0"/>
-                <a:cs typeface="Georgia"/>
-              </a:rPr>
-              <a:t>What is a domain name?</a:t>
-            </a:r>
-          </a:p>
-          <a:p>
-            <a:pPr marL="12700" algn="ctr">
-              <a:lnSpc>
-                <a:spcPct val="100000"/>
-              </a:lnSpc>
-              <a:buSzPct val="74242"/>
-              <a:tabLst>
-                <a:tab pos="445770" algn="l"/>
-                <a:tab pos="446405" algn="l"/>
-              </a:tabLst>
-            </a:pPr>
-            <a:endParaRPr lang="en-US" sz="3600" spc="-5" dirty="0">
-              <a:solidFill>
-                <a:srgbClr val="5F5F5F"/>
-              </a:solidFill>
-              <a:latin typeface="Georgia" panose="02040502050405020303" pitchFamily="18" charset="0"/>
-              <a:cs typeface="Georgia"/>
-            </a:endParaRPr>
-          </a:p>
-          <a:p>
-            <a:pPr marL="12700">
-              <a:lnSpc>
-                <a:spcPct val="100000"/>
-              </a:lnSpc>
-              <a:buSzPct val="150000"/>
-              <a:tabLst>
-                <a:tab pos="445770" algn="l"/>
-                <a:tab pos="446405" algn="l"/>
-              </a:tabLst>
-            </a:pPr>
-            <a:r>
-              <a:rPr lang="en-US" sz="3600" spc="-5" dirty="0">
-                <a:solidFill>
-                  <a:srgbClr val="5F5F5F"/>
-                </a:solidFill>
-                <a:latin typeface="Georgia"/>
-              </a:rPr>
-              <a:t>The Domain Name System, or </a:t>
-            </a:r>
-            <a:r>
-              <a:rPr lang="en-US" sz="3600" b="1" spc="-5" dirty="0">
-                <a:solidFill>
-                  <a:srgbClr val="5F5F5F"/>
-                </a:solidFill>
-                <a:latin typeface="Georgia"/>
-              </a:rPr>
-              <a:t>DNS</a:t>
-            </a:r>
-            <a:r>
-              <a:rPr lang="en-US" sz="3600" spc="-5" dirty="0">
-                <a:solidFill>
-                  <a:srgbClr val="5F5F5F"/>
-                </a:solidFill>
-                <a:latin typeface="Georgia"/>
-              </a:rPr>
-              <a:t>, is like a phone book for the internet</a:t>
-            </a:r>
-          </a:p>
-          <a:p>
-            <a:pPr marL="12700">
-              <a:lnSpc>
-                <a:spcPct val="100000"/>
-              </a:lnSpc>
-              <a:buSzPct val="150000"/>
-              <a:tabLst>
-                <a:tab pos="445770" algn="l"/>
-                <a:tab pos="446405" algn="l"/>
-              </a:tabLst>
-            </a:pPr>
-            <a:endParaRPr lang="en-US" sz="3600" spc="-5" dirty="0">
-              <a:solidFill>
-                <a:srgbClr val="5F5F5F"/>
-              </a:solidFill>
-              <a:latin typeface="Georgia"/>
-            </a:endParaRPr>
-          </a:p>
-          <a:p>
-            <a:pPr marL="12700">
-              <a:lnSpc>
-                <a:spcPct val="100000"/>
-              </a:lnSpc>
-              <a:buSzPct val="150000"/>
-              <a:tabLst>
-                <a:tab pos="445770" algn="l"/>
-                <a:tab pos="446405" algn="l"/>
-              </a:tabLst>
-            </a:pPr>
-            <a:r>
-              <a:rPr lang="en-US" sz="3600" spc="-5" dirty="0">
-                <a:solidFill>
-                  <a:srgbClr val="5F5F5F"/>
-                </a:solidFill>
-                <a:latin typeface="Georgia"/>
-              </a:rPr>
-              <a:t>It’s essentially a list that maps the location of files on a server (identified by a series of unique numbers called an IP Address) to a friendly name, like Wikipedia.org</a:t>
-            </a:r>
-          </a:p>
-        </p:txBody>
-      </p:sp>
-      <p:sp>
-        <p:nvSpPr>
-          <p:cNvPr id="4" name="object 4"/>
-          <p:cNvSpPr txBox="1">
-            <a:spLocks noGrp="1"/>
-          </p:cNvSpPr>
-          <p:nvPr>
-            <p:ph type="title"/>
-          </p:nvPr>
-        </p:nvSpPr>
-        <p:spPr>
-          <a:xfrm>
-            <a:off x="3860800" y="444500"/>
-            <a:ext cx="5278755" cy="761365"/>
-          </a:xfrm>
-          <a:prstGeom prst="rect">
-            <a:avLst/>
-          </a:prstGeom>
-        </p:spPr>
-        <p:txBody>
-          <a:bodyPr vert="horz" wrap="square" lIns="0" tIns="0" rIns="0" bIns="0" rtlCol="0">
-            <a:spAutoFit/>
-          </a:bodyPr>
-          <a:lstStyle/>
-          <a:p>
-            <a:pPr marL="12700">
-              <a:lnSpc>
-                <a:spcPts val="5995"/>
-              </a:lnSpc>
-            </a:pPr>
-            <a:r>
-              <a:rPr sz="5000" dirty="0"/>
-              <a:t>PRACTICE, </a:t>
-            </a:r>
-            <a:r>
-              <a:rPr sz="5000" spc="-80" dirty="0"/>
-              <a:t>STUDY,</a:t>
-            </a:r>
-            <a:r>
-              <a:rPr sz="5000" spc="-95" dirty="0"/>
-              <a:t> </a:t>
-            </a:r>
-            <a:r>
-              <a:rPr sz="5000" dirty="0"/>
-              <a:t>PRACTICE</a:t>
-            </a:r>
-            <a:endParaRPr sz="5000"/>
-          </a:p>
-        </p:txBody>
-      </p:sp>
-      <p:sp>
-        <p:nvSpPr>
-          <p:cNvPr id="6" name="object 2"/>
-          <p:cNvSpPr/>
-          <p:nvPr/>
-        </p:nvSpPr>
-        <p:spPr>
-          <a:xfrm>
-            <a:off x="0" y="0"/>
-            <a:ext cx="13004800" cy="1661795"/>
-          </a:xfrm>
-          <a:custGeom>
-            <a:avLst/>
-            <a:gdLst/>
-            <a:ahLst/>
-            <a:cxnLst/>
-            <a:rect l="l" t="t" r="r" b="b"/>
-            <a:pathLst>
-              <a:path w="13004800" h="1661795">
-                <a:moveTo>
-                  <a:pt x="0" y="1661579"/>
-                </a:moveTo>
-                <a:lnTo>
-                  <a:pt x="0" y="0"/>
-                </a:lnTo>
-                <a:lnTo>
-                  <a:pt x="13004800" y="0"/>
-                </a:lnTo>
-                <a:lnTo>
-                  <a:pt x="13004800" y="1661579"/>
-                </a:lnTo>
-                <a:lnTo>
-                  <a:pt x="0" y="1661579"/>
-                </a:lnTo>
-                <a:close/>
-              </a:path>
-            </a:pathLst>
-          </a:custGeom>
-          <a:solidFill>
-            <a:srgbClr val="35758E"/>
-          </a:solidFill>
-        </p:spPr>
-        <p:txBody>
-          <a:bodyPr wrap="square" lIns="0" tIns="0" rIns="0" bIns="0" rtlCol="0"/>
-          <a:lstStyle/>
-          <a:p>
-            <a:endParaRPr/>
-          </a:p>
-        </p:txBody>
-      </p:sp>
-      <p:sp>
-        <p:nvSpPr>
-          <p:cNvPr id="7" name="object 3"/>
-          <p:cNvSpPr txBox="1">
-            <a:spLocks/>
-          </p:cNvSpPr>
-          <p:nvPr/>
-        </p:nvSpPr>
-        <p:spPr>
-          <a:xfrm>
-            <a:off x="4427855" y="436424"/>
-            <a:ext cx="4711700" cy="769441"/>
-          </a:xfrm>
-          <a:prstGeom prst="rect">
-            <a:avLst/>
-          </a:prstGeom>
-        </p:spPr>
-        <p:txBody>
-          <a:bodyPr vert="horz" wrap="square" lIns="0" tIns="0" rIns="0" bIns="0" rtlCol="0">
-            <a:spAutoFit/>
-          </a:bodyPr>
-          <a:lstStyle>
-            <a:lvl1pPr>
-              <a:defRPr sz="7800" b="1" i="0">
-                <a:solidFill>
-                  <a:schemeClr val="bg1"/>
-                </a:solidFill>
-                <a:latin typeface="Bebas Neue Bold"/>
-                <a:ea typeface="+mj-ea"/>
-                <a:cs typeface="Bebas Neue Bold"/>
-              </a:defRPr>
-            </a:lvl1pPr>
-          </a:lstStyle>
-          <a:p>
-            <a:pPr marL="12700">
-              <a:lnSpc>
-                <a:spcPts val="5995"/>
-              </a:lnSpc>
-            </a:pPr>
-            <a:r>
-              <a:rPr lang="en-US" sz="5000" kern="0" dirty="0"/>
-              <a:t>Domains &amp; hosting</a:t>
-            </a:r>
-          </a:p>
-        </p:txBody>
-      </p:sp>
-    </p:spTree>
-    <p:extLst>
-      <p:ext uri="{BB962C8B-B14F-4D97-AF65-F5344CB8AC3E}">
-        <p14:creationId xmlns:p14="http://schemas.microsoft.com/office/powerpoint/2010/main" val="1570766115"/>
-      </p:ext>
-    </p:extLst>
-  </p:cSld>
-  <p:clrMapOvr>
-    <a:masterClrMapping/>
-  </p:clrMapOvr>
+  <p:timing>
+    <p:tnLst>
+      <p:par>
+        <p:cTn id="1" dur="indefinite" restart="never" nodeType="tmRoot"/>
+      </p:par>
+    </p:tnLst>
+  </p:timing>
 </p:sld>
 </file>
 
@@ -27564,7 +28985,7 @@
         <p:spPr>
           <a:xfrm>
             <a:off x="1446847" y="2819400"/>
-            <a:ext cx="9780905" cy="5201424"/>
+            <a:ext cx="9780905" cy="5816977"/>
           </a:xfrm>
           <a:prstGeom prst="rect">
             <a:avLst/>
@@ -27576,6 +28997,20 @@
           </a:bodyPr>
           <a:lstStyle/>
           <a:p>
+            <a:pPr>
+              <a:lnSpc>
+                <a:spcPct val="100000"/>
+              </a:lnSpc>
+              <a:buClr>
+                <a:srgbClr val="5F5F5F"/>
+              </a:buClr>
+            </a:pPr>
+            <a:endParaRPr sz="3600" dirty="0">
+              <a:latin typeface="Georgia" panose="02040502050405020303" pitchFamily="18" charset="0"/>
+              <a:cs typeface="Times New Roman"/>
+            </a:endParaRPr>
+          </a:p>
+          <a:p>
             <a:pPr marL="12700" algn="ctr">
               <a:lnSpc>
                 <a:spcPct val="100000"/>
@@ -27594,7 +29029,7 @@
                 <a:latin typeface="Georgia" panose="02040502050405020303" pitchFamily="18" charset="0"/>
                 <a:cs typeface="Georgia"/>
               </a:rPr>
-              <a:t>How do I buy a domain name?</a:t>
+              <a:t>What is a domain name?</a:t>
             </a:r>
           </a:p>
           <a:p>
@@ -27634,7 +29069,25 @@
                 </a:solidFill>
                 <a:latin typeface="Georgia"/>
               </a:rPr>
-              <a:t>Companies called registrars manage the reservation of domain names</a:t>
+              <a:t>The Domain Name System, or </a:t>
+            </a:r>
+            <a:r>
+              <a:rPr lang="en-US" sz="3600" b="1" spc="-5" dirty="0">
+                <a:solidFill>
+                  <a:srgbClr val="5F5F5F"/>
+                </a:solidFill>
+                <a:latin typeface="Georgia"/>
+              </a:rPr>
+              <a:t>DNS</a:t>
+            </a:r>
+            <a:r>
+              <a:rPr lang="en-US" sz="3600" spc="-5" dirty="0">
+                <a:solidFill>
+                  <a:srgbClr val="5F5F5F"/>
+                </a:solidFill>
+                <a:latin typeface="Georgia"/>
+              </a:rPr>
+              <a:t>, is like a phone book for the internet</a:t>
             </a:r>
           </a:p>
           <a:p>
@@ -27656,69 +29109,24 @@
             </a:endParaRPr>
           </a:p>
           <a:p>
-            <a:pPr marL="469900" indent="-457200">
+            <a:pPr marL="12700">
               <a:lnSpc>
                 <a:spcPct val="100000"/>
               </a:lnSpc>
               <a:buSzPct val="150000"/>
-              <a:buFont typeface="Arial" panose="020B0604020202020204" pitchFamily="34" charset="0"/>
-              <a:buChar char="•"/>
               <a:tabLst>
                 <a:tab pos="445770" algn="l"/>
                 <a:tab pos="446405" algn="l"/>
               </a:tabLst>
             </a:pPr>
             <a:r>
-              <a:rPr lang="en-US" sz="2800" spc="-5" dirty="0">
-                <a:solidFill>
-                  <a:srgbClr val="5F5F5F"/>
-                </a:solidFill>
-                <a:latin typeface="Georgia"/>
-              </a:rPr>
-              <a:t>GoDaddy is one of the largest registrars, but many smaller companies also provide this service</a:t>
-            </a:r>
-          </a:p>
-          <a:p>
-            <a:pPr marL="469900" indent="-457200">
-              <a:lnSpc>
-                <a:spcPct val="100000"/>
-              </a:lnSpc>
-              <a:buSzPct val="150000"/>
-              <a:buFont typeface="Arial" panose="020B0604020202020204" pitchFamily="34" charset="0"/>
-              <a:buChar char="•"/>
-              <a:tabLst>
-                <a:tab pos="445770" algn="l"/>
-                <a:tab pos="446405" algn="l"/>
-              </a:tabLst>
-            </a:pPr>
-            <a:endParaRPr lang="en-US" sz="2800" spc="-5" dirty="0">
-              <a:solidFill>
-                <a:srgbClr val="5F5F5F"/>
-              </a:solidFill>
-              <a:latin typeface="Georgia"/>
-            </a:endParaRPr>
-          </a:p>
-          <a:p>
-            <a:pPr marL="469900" indent="-457200">
-              <a:lnSpc>
-                <a:spcPct val="100000"/>
-              </a:lnSpc>
-              <a:buSzPct val="150000"/>
-              <a:buFont typeface="Arial" panose="020B0604020202020204" pitchFamily="34" charset="0"/>
-              <a:buChar char="•"/>
-              <a:tabLst>
-                <a:tab pos="445770" algn="l"/>
-                <a:tab pos="446405" algn="l"/>
-              </a:tabLst>
-            </a:pPr>
-            <a:r>
-              <a:rPr lang="en-US" sz="2800" spc="-5" dirty="0">
-                <a:solidFill>
-                  <a:srgbClr val="5F5F5F"/>
-                </a:solidFill>
-                <a:latin typeface="Georgia"/>
-              </a:rPr>
-              <a:t>ICANN is the agency responsible for regulating and accrediting registrars</a:t>
+              <a:rPr lang="en-US" sz="3600" spc="-5" dirty="0">
+                <a:solidFill>
+                  <a:srgbClr val="5F5F5F"/>
+                </a:solidFill>
+                <a:latin typeface="Georgia"/>
+              </a:rPr>
+              <a:t>It’s essentially a list that maps the location of files on a server (identified by a series of unique numbers called an IP Address) to a friendly name, like Wikipedia.org</a:t>
             </a:r>
           </a:p>
         </p:txBody>
@@ -27872,7 +29280,7 @@
     </p:spTree>
     <p:extLst>
       <p:ext uri="{BB962C8B-B14F-4D97-AF65-F5344CB8AC3E}">
-        <p14:creationId xmlns:p14="http://schemas.microsoft.com/office/powerpoint/2010/main" val="3783041760"/>
+        <p14:creationId xmlns:p14="http://schemas.microsoft.com/office/powerpoint/2010/main" val="1570766115"/>
       </p:ext>
     </p:extLst>
   </p:cSld>
@@ -27957,8 +29365,8 @@
         </p:nvSpPr>
         <p:spPr>
           <a:xfrm>
-            <a:off x="1457800" y="2438400"/>
-            <a:ext cx="10084753" cy="6278642"/>
+            <a:off x="1446847" y="2819400"/>
+            <a:ext cx="9780905" cy="5201424"/>
           </a:xfrm>
           <a:prstGeom prst="rect">
             <a:avLst/>
@@ -27988,29 +29396,7 @@
                 <a:latin typeface="Georgia" panose="02040502050405020303" pitchFamily="18" charset="0"/>
                 <a:cs typeface="Georgia"/>
               </a:rPr>
-              <a:t>I bought a domain name…</a:t>
-            </a:r>
-          </a:p>
-          <a:p>
-            <a:pPr marL="12700" algn="ctr">
-              <a:lnSpc>
-                <a:spcPct val="100000"/>
-              </a:lnSpc>
-              <a:buSzPct val="74242"/>
-              <a:tabLst>
-                <a:tab pos="445770" algn="l"/>
-                <a:tab pos="446405" algn="l"/>
-              </a:tabLst>
-            </a:pPr>
-            <a:r>
-              <a:rPr lang="en-US" sz="5400" dirty="0">
-                <a:solidFill>
-                  <a:srgbClr val="5F5F5F"/>
-                </a:solidFill>
-                <a:latin typeface="Georgia" panose="02040502050405020303" pitchFamily="18" charset="0"/>
-                <a:cs typeface="Georgia"/>
-              </a:rPr>
-              <a:t>now what?</a:t>
+              <a:t>How do I buy a domain name?</a:t>
             </a:r>
           </a:p>
           <a:p>
@@ -28044,13 +29430,13 @@
               </a:tabLst>
             </a:pPr>
             <a:r>
-              <a:rPr lang="en-US" sz="3200" spc="-5" dirty="0">
-                <a:solidFill>
-                  <a:srgbClr val="5F5F5F"/>
-                </a:solidFill>
-                <a:latin typeface="Georgia"/>
-              </a:rPr>
-              <a:t>Registering a domain name maps that name to a location where the files will be hosted, but does NOT necessarily provide server space for your files</a:t>
+              <a:rPr lang="en-US" sz="3600" spc="-5" dirty="0">
+                <a:solidFill>
+                  <a:srgbClr val="5F5F5F"/>
+                </a:solidFill>
+                <a:latin typeface="Georgia"/>
+              </a:rPr>
+              <a:t>Companies called registrars manage the reservation of domain names</a:t>
             </a:r>
           </a:p>
           <a:p>
@@ -28064,7 +29450,7 @@
                 <a:tab pos="446405" algn="l"/>
               </a:tabLst>
             </a:pPr>
-            <a:endParaRPr lang="en-US" sz="2800" spc="-5" dirty="0">
+            <a:endParaRPr lang="en-US" sz="3600" spc="-5" dirty="0">
               <a:solidFill>
                 <a:srgbClr val="5F5F5F"/>
               </a:solidFill>
@@ -28091,7 +29477,7 @@
                 </a:solidFill>
                 <a:latin typeface="Georgia"/>
               </a:rPr>
-              <a:t>GoDaddy will both register and host your website, as will many other companies</a:t>
+              <a:t>GoDaddy is one of the largest registrars, but many smaller companies also provide this service</a:t>
             </a:r>
           </a:p>
           <a:p>
@@ -28134,7 +29520,7 @@
                 </a:solidFill>
                 <a:latin typeface="Georgia"/>
               </a:rPr>
-              <a:t>You can buy a domain name from one company and host your files at another (or, host from a computer you own!)</a:t>
+              <a:t>ICANN is the agency responsible for regulating and accrediting registrars</a:t>
             </a:r>
           </a:p>
         </p:txBody>
@@ -28288,6 +29674,422 @@
     </p:spTree>
     <p:extLst>
       <p:ext uri="{BB962C8B-B14F-4D97-AF65-F5344CB8AC3E}">
+        <p14:creationId xmlns:p14="http://schemas.microsoft.com/office/powerpoint/2010/main" val="3783041760"/>
+      </p:ext>
+    </p:extLst>
+  </p:cSld>
+  <p:clrMapOvr>
+    <a:masterClrMapping/>
+  </p:clrMapOvr>
+</p:sld>
+</file>
+
+<file path=ppt/slides/slide56.xml><?xml version="1.0" encoding="utf-8"?>
+<p:sld xmlns:a="http://schemas.openxmlformats.org/drawingml/2006/main" xmlns:r="http://schemas.openxmlformats.org/officeDocument/2006/relationships" xmlns:p="http://schemas.openxmlformats.org/presentationml/2006/main">
+  <p:cSld>
+    <p:spTree>
+      <p:nvGrpSpPr>
+        <p:cNvPr id="1" name=""/>
+        <p:cNvGrpSpPr/>
+        <p:nvPr/>
+      </p:nvGrpSpPr>
+      <p:grpSpPr>
+        <a:xfrm>
+          <a:off x="0" y="0"/>
+          <a:ext cx="0" cy="0"/>
+          <a:chOff x="0" y="0"/>
+          <a:chExt cx="0" cy="0"/>
+        </a:xfrm>
+      </p:grpSpPr>
+      <p:sp>
+        <p:nvSpPr>
+          <p:cNvPr id="2" name="object 2"/>
+          <p:cNvSpPr/>
+          <p:nvPr/>
+        </p:nvSpPr>
+        <p:spPr>
+          <a:xfrm>
+            <a:off x="0" y="0"/>
+            <a:ext cx="13004800" cy="1661795"/>
+          </a:xfrm>
+          <a:custGeom>
+            <a:avLst/>
+            <a:gdLst/>
+            <a:ahLst/>
+            <a:cxnLst/>
+            <a:rect l="l" t="t" r="r" b="b"/>
+            <a:pathLst>
+              <a:path w="13004800" h="1661795">
+                <a:moveTo>
+                  <a:pt x="0" y="1661579"/>
+                </a:moveTo>
+                <a:lnTo>
+                  <a:pt x="0" y="0"/>
+                </a:lnTo>
+                <a:lnTo>
+                  <a:pt x="13004800" y="0"/>
+                </a:lnTo>
+                <a:lnTo>
+                  <a:pt x="13004800" y="1661579"/>
+                </a:lnTo>
+                <a:lnTo>
+                  <a:pt x="0" y="1661579"/>
+                </a:lnTo>
+                <a:close/>
+              </a:path>
+            </a:pathLst>
+          </a:custGeom>
+          <a:solidFill>
+            <a:srgbClr val="209078"/>
+          </a:solidFill>
+        </p:spPr>
+        <p:txBody>
+          <a:bodyPr wrap="square" lIns="0" tIns="0" rIns="0" bIns="0" rtlCol="0"/>
+          <a:lstStyle/>
+          <a:p>
+            <a:endParaRPr/>
+          </a:p>
+        </p:txBody>
+      </p:sp>
+      <p:sp>
+        <p:nvSpPr>
+          <p:cNvPr id="3" name="object 3"/>
+          <p:cNvSpPr txBox="1"/>
+          <p:nvPr/>
+        </p:nvSpPr>
+        <p:spPr>
+          <a:xfrm>
+            <a:off x="1457800" y="2438400"/>
+            <a:ext cx="10084753" cy="6278642"/>
+          </a:xfrm>
+          <a:prstGeom prst="rect">
+            <a:avLst/>
+          </a:prstGeom>
+        </p:spPr>
+        <p:txBody>
+          <a:bodyPr vert="horz" wrap="square" lIns="0" tIns="0" rIns="0" bIns="0" rtlCol="0">
+            <a:spAutoFit/>
+          </a:bodyPr>
+          <a:lstStyle/>
+          <a:p>
+            <a:pPr marL="12700" algn="ctr">
+              <a:lnSpc>
+                <a:spcPct val="100000"/>
+              </a:lnSpc>
+              <a:buSzPct val="74242"/>
+              <a:tabLst>
+                <a:tab pos="445770" algn="l"/>
+                <a:tab pos="446405" algn="l"/>
+              </a:tabLst>
+            </a:pPr>
+            <a:r>
+              <a:rPr lang="en-US" sz="5400" dirty="0">
+                <a:solidFill>
+                  <a:srgbClr val="5F5F5F"/>
+                </a:solidFill>
+                <a:latin typeface="Georgia" panose="02040502050405020303" pitchFamily="18" charset="0"/>
+                <a:cs typeface="Georgia"/>
+              </a:rPr>
+              <a:t>I bought a domain name…</a:t>
+            </a:r>
+          </a:p>
+          <a:p>
+            <a:pPr marL="12700" algn="ctr">
+              <a:lnSpc>
+                <a:spcPct val="100000"/>
+              </a:lnSpc>
+              <a:buSzPct val="74242"/>
+              <a:tabLst>
+                <a:tab pos="445770" algn="l"/>
+                <a:tab pos="446405" algn="l"/>
+              </a:tabLst>
+            </a:pPr>
+            <a:r>
+              <a:rPr lang="en-US" sz="5400" dirty="0">
+                <a:solidFill>
+                  <a:srgbClr val="5F5F5F"/>
+                </a:solidFill>
+                <a:latin typeface="Georgia" panose="02040502050405020303" pitchFamily="18" charset="0"/>
+                <a:cs typeface="Georgia"/>
+              </a:rPr>
+              <a:t>now what?</a:t>
+            </a:r>
+          </a:p>
+          <a:p>
+            <a:pPr marL="12700" algn="ctr">
+              <a:lnSpc>
+                <a:spcPct val="100000"/>
+              </a:lnSpc>
+              <a:buSzPct val="74242"/>
+              <a:tabLst>
+                <a:tab pos="445770" algn="l"/>
+                <a:tab pos="446405" algn="l"/>
+              </a:tabLst>
+            </a:pPr>
+            <a:endParaRPr lang="en-US" sz="3600" spc="-5" dirty="0">
+              <a:solidFill>
+                <a:srgbClr val="5F5F5F"/>
+              </a:solidFill>
+              <a:latin typeface="Georgia" panose="02040502050405020303" pitchFamily="18" charset="0"/>
+              <a:cs typeface="Georgia"/>
+            </a:endParaRPr>
+          </a:p>
+          <a:p>
+            <a:pPr marL="12700">
+              <a:lnSpc>
+                <a:spcPct val="100000"/>
+              </a:lnSpc>
+              <a:buSzPct val="150000"/>
+              <a:tabLst>
+                <a:tab pos="445770" algn="l"/>
+                <a:tab pos="446405" algn="l"/>
+              </a:tabLst>
+            </a:pPr>
+            <a:r>
+              <a:rPr lang="en-US" sz="3200" spc="-5" dirty="0">
+                <a:solidFill>
+                  <a:srgbClr val="5F5F5F"/>
+                </a:solidFill>
+                <a:latin typeface="Georgia"/>
+              </a:rPr>
+              <a:t>Registering a domain name maps that name to a location where the files will be hosted, but does NOT necessarily provide server space for your files</a:t>
+            </a:r>
+          </a:p>
+          <a:p>
+            <a:pPr marL="12700">
+              <a:lnSpc>
+                <a:spcPct val="100000"/>
+              </a:lnSpc>
+              <a:buSzPct val="150000"/>
+              <a:tabLst>
+                <a:tab pos="445770" algn="l"/>
+                <a:tab pos="446405" algn="l"/>
+              </a:tabLst>
+            </a:pPr>
+            <a:endParaRPr lang="en-US" sz="2800" spc="-5" dirty="0">
+              <a:solidFill>
+                <a:srgbClr val="5F5F5F"/>
+              </a:solidFill>
+              <a:latin typeface="Georgia"/>
+            </a:endParaRPr>
+          </a:p>
+          <a:p>
+            <a:pPr marL="469900" indent="-457200">
+              <a:lnSpc>
+                <a:spcPct val="100000"/>
+              </a:lnSpc>
+              <a:buSzPct val="150000"/>
+              <a:buFont typeface="Arial" panose="020B0604020202020204" pitchFamily="34" charset="0"/>
+              <a:buChar char="•"/>
+              <a:tabLst>
+                <a:tab pos="445770" algn="l"/>
+                <a:tab pos="446405" algn="l"/>
+              </a:tabLst>
+            </a:pPr>
+            <a:r>
+              <a:rPr lang="en-US" sz="2800" spc="-5" dirty="0">
+                <a:solidFill>
+                  <a:srgbClr val="5F5F5F"/>
+                </a:solidFill>
+                <a:latin typeface="Georgia"/>
+              </a:rPr>
+              <a:t>GoDaddy will both register and host your website, as will many other companies</a:t>
+            </a:r>
+          </a:p>
+          <a:p>
+            <a:pPr marL="469900" indent="-457200">
+              <a:lnSpc>
+                <a:spcPct val="100000"/>
+              </a:lnSpc>
+              <a:buSzPct val="150000"/>
+              <a:buFont typeface="Arial" panose="020B0604020202020204" pitchFamily="34" charset="0"/>
+              <a:buChar char="•"/>
+              <a:tabLst>
+                <a:tab pos="445770" algn="l"/>
+                <a:tab pos="446405" algn="l"/>
+              </a:tabLst>
+            </a:pPr>
+            <a:endParaRPr lang="en-US" sz="2800" spc="-5" dirty="0">
+              <a:solidFill>
+                <a:srgbClr val="5F5F5F"/>
+              </a:solidFill>
+              <a:latin typeface="Georgia"/>
+            </a:endParaRPr>
+          </a:p>
+          <a:p>
+            <a:pPr marL="469900" indent="-457200">
+              <a:lnSpc>
+                <a:spcPct val="100000"/>
+              </a:lnSpc>
+              <a:buSzPct val="150000"/>
+              <a:buFont typeface="Arial" panose="020B0604020202020204" pitchFamily="34" charset="0"/>
+              <a:buChar char="•"/>
+              <a:tabLst>
+                <a:tab pos="445770" algn="l"/>
+                <a:tab pos="446405" algn="l"/>
+              </a:tabLst>
+            </a:pPr>
+            <a:r>
+              <a:rPr lang="en-US" sz="2800" spc="-5" dirty="0">
+                <a:solidFill>
+                  <a:srgbClr val="5F5F5F"/>
+                </a:solidFill>
+                <a:latin typeface="Georgia"/>
+              </a:rPr>
+              <a:t>You can buy a domain name from one company and host your files at another (or, host from a computer you own!)</a:t>
+            </a:r>
+          </a:p>
+        </p:txBody>
+      </p:sp>
+      <p:sp>
+        <p:nvSpPr>
+          <p:cNvPr id="4" name="object 4"/>
+          <p:cNvSpPr txBox="1">
+            <a:spLocks noGrp="1"/>
+          </p:cNvSpPr>
+          <p:nvPr>
+            <p:ph type="title"/>
+          </p:nvPr>
+        </p:nvSpPr>
+        <p:spPr>
+          <a:xfrm>
+            <a:off x="3860800" y="444500"/>
+            <a:ext cx="5278755" cy="761365"/>
+          </a:xfrm>
+          <a:prstGeom prst="rect">
+            <a:avLst/>
+          </a:prstGeom>
+        </p:spPr>
+        <p:txBody>
+          <a:bodyPr vert="horz" wrap="square" lIns="0" tIns="0" rIns="0" bIns="0" rtlCol="0">
+            <a:spAutoFit/>
+          </a:bodyPr>
+          <a:lstStyle/>
+          <a:p>
+            <a:pPr marL="12700">
+              <a:lnSpc>
+                <a:spcPts val="5995"/>
+              </a:lnSpc>
+            </a:pPr>
+            <a:r>
+              <a:rPr sz="5000" dirty="0"/>
+              <a:t>PRACTICE, </a:t>
+            </a:r>
+            <a:r>
+              <a:rPr sz="5000" spc="-80" dirty="0"/>
+              <a:t>STUDY,</a:t>
+            </a:r>
+            <a:r>
+              <a:rPr sz="5000" spc="-95" dirty="0"/>
+              <a:t> </a:t>
+            </a:r>
+            <a:r>
+              <a:rPr sz="5000" dirty="0"/>
+              <a:t>PRACTICE</a:t>
+            </a:r>
+            <a:endParaRPr sz="5000"/>
+          </a:p>
+        </p:txBody>
+      </p:sp>
+      <p:sp>
+        <p:nvSpPr>
+          <p:cNvPr id="6" name="object 2"/>
+          <p:cNvSpPr/>
+          <p:nvPr/>
+        </p:nvSpPr>
+        <p:spPr>
+          <a:xfrm>
+            <a:off x="0" y="0"/>
+            <a:ext cx="13004800" cy="1661795"/>
+          </a:xfrm>
+          <a:custGeom>
+            <a:avLst/>
+            <a:gdLst/>
+            <a:ahLst/>
+            <a:cxnLst/>
+            <a:rect l="l" t="t" r="r" b="b"/>
+            <a:pathLst>
+              <a:path w="13004800" h="1661795">
+                <a:moveTo>
+                  <a:pt x="0" y="1661579"/>
+                </a:moveTo>
+                <a:lnTo>
+                  <a:pt x="0" y="0"/>
+                </a:lnTo>
+                <a:lnTo>
+                  <a:pt x="13004800" y="0"/>
+                </a:lnTo>
+                <a:lnTo>
+                  <a:pt x="13004800" y="1661579"/>
+                </a:lnTo>
+                <a:lnTo>
+                  <a:pt x="0" y="1661579"/>
+                </a:lnTo>
+                <a:close/>
+              </a:path>
+            </a:pathLst>
+          </a:custGeom>
+          <a:solidFill>
+            <a:srgbClr val="35758E"/>
+          </a:solidFill>
+        </p:spPr>
+        <p:txBody>
+          <a:bodyPr wrap="square" lIns="0" tIns="0" rIns="0" bIns="0" rtlCol="0"/>
+          <a:lstStyle/>
+          <a:p>
+            <a:endParaRPr/>
+          </a:p>
+        </p:txBody>
+      </p:sp>
+      <p:sp>
+        <p:nvSpPr>
+          <p:cNvPr id="7" name="object 3"/>
+          <p:cNvSpPr txBox="1">
+            <a:spLocks/>
+          </p:cNvSpPr>
+          <p:nvPr/>
+        </p:nvSpPr>
+        <p:spPr>
+          <a:xfrm>
+            <a:off x="4427855" y="436424"/>
+            <a:ext cx="4711700" cy="769441"/>
+          </a:xfrm>
+          <a:prstGeom prst="rect">
+            <a:avLst/>
+          </a:prstGeom>
+        </p:spPr>
+        <p:txBody>
+          <a:bodyPr vert="horz" wrap="square" lIns="0" tIns="0" rIns="0" bIns="0" rtlCol="0">
+            <a:spAutoFit/>
+          </a:bodyPr>
+          <a:lstStyle>
+            <a:lvl1pPr>
+              <a:defRPr sz="7800" b="1" i="0">
+                <a:solidFill>
+                  <a:schemeClr val="bg1"/>
+                </a:solidFill>
+                <a:latin typeface="Bebas Neue Bold"/>
+                <a:ea typeface="+mj-ea"/>
+                <a:cs typeface="Bebas Neue Bold"/>
+              </a:defRPr>
+            </a:lvl1pPr>
+          </a:lstStyle>
+          <a:p>
+            <a:pPr marL="12700">
+              <a:lnSpc>
+                <a:spcPts val="5995"/>
+              </a:lnSpc>
+            </a:pPr>
+            <a:r>
+              <a:rPr lang="en-US" sz="5000" kern="0" dirty="0"/>
+              <a:t>Domains &amp; hosting</a:t>
+            </a:r>
+          </a:p>
+        </p:txBody>
+      </p:sp>
+    </p:spTree>
+    <p:extLst>
+      <p:ext uri="{BB962C8B-B14F-4D97-AF65-F5344CB8AC3E}">
         <p14:creationId xmlns:p14="http://schemas.microsoft.com/office/powerpoint/2010/main" val="3549977280"/>
       </p:ext>
     </p:extLst>
@@ -28298,7 +30100,7 @@
 </p:sld>
 </file>
 
-<file path=ppt/slides/slide56.xml><?xml version="1.0" encoding="utf-8"?>
+<file path=ppt/slides/slide57.xml><?xml version="1.0" encoding="utf-8"?>
 <p:sld xmlns:a="http://schemas.openxmlformats.org/drawingml/2006/main" xmlns:r="http://schemas.openxmlformats.org/officeDocument/2006/relationships" xmlns:p="http://schemas.openxmlformats.org/presentationml/2006/main">
   <p:cSld>
     <p:spTree>
@@ -28746,7 +30548,7 @@
 </p:sld>
 </file>
 
-<file path=ppt/slides/slide57.xml><?xml version="1.0" encoding="utf-8"?>
+<file path=ppt/slides/slide58.xml><?xml version="1.0" encoding="utf-8"?>
 <p:sld xmlns:a="http://schemas.openxmlformats.org/drawingml/2006/main" xmlns:r="http://schemas.openxmlformats.org/officeDocument/2006/relationships" xmlns:p="http://schemas.openxmlformats.org/presentationml/2006/main">
   <p:cSld>
     <p:spTree>
@@ -28853,7 +30655,7 @@
 </p:sld>
 </file>
 
-<file path=ppt/slides/slide58.xml><?xml version="1.0" encoding="utf-8"?>
+<file path=ppt/slides/slide59.xml><?xml version="1.0" encoding="utf-8"?>
 <p:sld xmlns:a="http://schemas.openxmlformats.org/drawingml/2006/main" xmlns:r="http://schemas.openxmlformats.org/officeDocument/2006/relationships" xmlns:p="http://schemas.openxmlformats.org/presentationml/2006/main" showMasterSp="0">
   <p:cSld>
     <p:spTree>
@@ -29117,7 +30919,402 @@
 </p:sld>
 </file>
 
-<file path=ppt/slides/slide59.xml><?xml version="1.0" encoding="utf-8"?>
+<file path=ppt/slides/slide6.xml><?xml version="1.0" encoding="utf-8"?>
+<p:sld xmlns:a="http://schemas.openxmlformats.org/drawingml/2006/main" xmlns:r="http://schemas.openxmlformats.org/officeDocument/2006/relationships" xmlns:p="http://schemas.openxmlformats.org/presentationml/2006/main" showMasterSp="0">
+  <p:cSld>
+    <p:spTree>
+      <p:nvGrpSpPr>
+        <p:cNvPr id="1" name=""/>
+        <p:cNvGrpSpPr/>
+        <p:nvPr/>
+      </p:nvGrpSpPr>
+      <p:grpSpPr>
+        <a:xfrm>
+          <a:off x="0" y="0"/>
+          <a:ext cx="0" cy="0"/>
+          <a:chOff x="0" y="0"/>
+          <a:chExt cx="0" cy="0"/>
+        </a:xfrm>
+      </p:grpSpPr>
+      <p:sp>
+        <p:nvSpPr>
+          <p:cNvPr id="8" name="object 2"/>
+          <p:cNvSpPr/>
+          <p:nvPr/>
+        </p:nvSpPr>
+        <p:spPr>
+          <a:xfrm>
+            <a:off x="0" y="0"/>
+            <a:ext cx="13004800" cy="1796544"/>
+          </a:xfrm>
+          <a:custGeom>
+            <a:avLst/>
+            <a:gdLst/>
+            <a:ahLst/>
+            <a:cxnLst/>
+            <a:rect l="l" t="t" r="r" b="b"/>
+            <a:pathLst>
+              <a:path w="13004800" h="2623820">
+                <a:moveTo>
+                  <a:pt x="0" y="2623807"/>
+                </a:moveTo>
+                <a:lnTo>
+                  <a:pt x="0" y="0"/>
+                </a:lnTo>
+                <a:lnTo>
+                  <a:pt x="13004800" y="0"/>
+                </a:lnTo>
+                <a:lnTo>
+                  <a:pt x="13004800" y="2623807"/>
+                </a:lnTo>
+                <a:lnTo>
+                  <a:pt x="0" y="2623807"/>
+                </a:lnTo>
+                <a:close/>
+              </a:path>
+            </a:pathLst>
+          </a:custGeom>
+          <a:solidFill>
+            <a:srgbClr val="209078"/>
+          </a:solidFill>
+        </p:spPr>
+        <p:txBody>
+          <a:bodyPr wrap="square" lIns="0" tIns="0" rIns="0" bIns="0" rtlCol="0"/>
+          <a:lstStyle/>
+          <a:p>
+            <a:endParaRPr/>
+          </a:p>
+        </p:txBody>
+      </p:sp>
+      <p:sp>
+        <p:nvSpPr>
+          <p:cNvPr id="2" name="object 2"/>
+          <p:cNvSpPr/>
+          <p:nvPr/>
+        </p:nvSpPr>
+        <p:spPr>
+          <a:xfrm>
+            <a:off x="0" y="-76200"/>
+            <a:ext cx="13004800" cy="1872744"/>
+          </a:xfrm>
+          <a:custGeom>
+            <a:avLst/>
+            <a:gdLst/>
+            <a:ahLst/>
+            <a:cxnLst/>
+            <a:rect l="l" t="t" r="r" b="b"/>
+            <a:pathLst>
+              <a:path w="13004800" h="2623820">
+                <a:moveTo>
+                  <a:pt x="0" y="2623807"/>
+                </a:moveTo>
+                <a:lnTo>
+                  <a:pt x="0" y="0"/>
+                </a:lnTo>
+                <a:lnTo>
+                  <a:pt x="13004800" y="0"/>
+                </a:lnTo>
+                <a:lnTo>
+                  <a:pt x="13004800" y="2623807"/>
+                </a:lnTo>
+                <a:lnTo>
+                  <a:pt x="0" y="2623807"/>
+                </a:lnTo>
+                <a:close/>
+              </a:path>
+            </a:pathLst>
+          </a:custGeom>
+          <a:solidFill>
+            <a:srgbClr val="CB3D31"/>
+          </a:solidFill>
+        </p:spPr>
+        <p:txBody>
+          <a:bodyPr wrap="square" lIns="0" tIns="0" rIns="0" bIns="0" rtlCol="0"/>
+          <a:lstStyle/>
+          <a:p>
+            <a:endParaRPr/>
+          </a:p>
+        </p:txBody>
+      </p:sp>
+      <p:sp>
+        <p:nvSpPr>
+          <p:cNvPr id="3" name="object 3"/>
+          <p:cNvSpPr txBox="1"/>
+          <p:nvPr/>
+        </p:nvSpPr>
+        <p:spPr>
+          <a:xfrm>
+            <a:off x="2002027" y="5047386"/>
+            <a:ext cx="7886700" cy="1026794"/>
+          </a:xfrm>
+          <a:prstGeom prst="rect">
+            <a:avLst/>
+          </a:prstGeom>
+        </p:spPr>
+        <p:txBody>
+          <a:bodyPr vert="horz" wrap="square" lIns="0" tIns="0" rIns="0" bIns="0" rtlCol="0">
+            <a:spAutoFit/>
+          </a:bodyPr>
+          <a:lstStyle/>
+          <a:p>
+            <a:pPr marL="12700">
+              <a:lnSpc>
+                <a:spcPct val="100000"/>
+              </a:lnSpc>
+              <a:tabLst>
+                <a:tab pos="570865" algn="l"/>
+                <a:tab pos="571500" algn="l"/>
+              </a:tabLst>
+            </a:pPr>
+            <a:r>
+              <a:rPr sz="3300" spc="-5" dirty="0">
+                <a:solidFill>
+                  <a:srgbClr val="5F5F5F"/>
+                </a:solidFill>
+                <a:latin typeface="Georgia"/>
+                <a:cs typeface="Georgia"/>
+              </a:rPr>
+              <a:t>Slides, </a:t>
+            </a:r>
+            <a:r>
+              <a:rPr lang="en-US" sz="3300" spc="-5" dirty="0">
+                <a:solidFill>
+                  <a:srgbClr val="5F5F5F"/>
+                </a:solidFill>
+                <a:latin typeface="Georgia"/>
+                <a:cs typeface="Georgia"/>
+              </a:rPr>
+              <a:t>sample files, “</a:t>
+            </a:r>
+            <a:r>
+              <a:rPr sz="3300" dirty="0">
+                <a:solidFill>
+                  <a:srgbClr val="5F5F5F"/>
+                </a:solidFill>
+                <a:latin typeface="Georgia"/>
+                <a:cs typeface="Georgia"/>
+              </a:rPr>
+              <a:t>homework</a:t>
+            </a:r>
+            <a:r>
+              <a:rPr lang="en-US" sz="3300" dirty="0">
+                <a:solidFill>
+                  <a:srgbClr val="5F5F5F"/>
+                </a:solidFill>
+                <a:latin typeface="Georgia"/>
+                <a:cs typeface="Georgia"/>
+              </a:rPr>
+              <a:t>"</a:t>
+            </a:r>
+            <a:r>
+              <a:rPr sz="3300" dirty="0">
+                <a:solidFill>
+                  <a:srgbClr val="5F5F5F"/>
+                </a:solidFill>
+                <a:latin typeface="Georgia"/>
+                <a:cs typeface="Georgia"/>
+              </a:rPr>
+              <a:t>, and </a:t>
+            </a:r>
+            <a:r>
+              <a:rPr sz="3300" spc="-5" dirty="0">
+                <a:solidFill>
+                  <a:srgbClr val="5F5F5F"/>
+                </a:solidFill>
+                <a:latin typeface="Georgia"/>
+                <a:cs typeface="Georgia"/>
+              </a:rPr>
+              <a:t>interesting</a:t>
+            </a:r>
+            <a:r>
+              <a:rPr sz="3300" spc="-30" dirty="0">
+                <a:solidFill>
+                  <a:srgbClr val="5F5F5F"/>
+                </a:solidFill>
+                <a:latin typeface="Georgia"/>
+                <a:cs typeface="Georgia"/>
+              </a:rPr>
+              <a:t> </a:t>
+            </a:r>
+            <a:r>
+              <a:rPr sz="3300" dirty="0">
+                <a:solidFill>
+                  <a:srgbClr val="5F5F5F"/>
+                </a:solidFill>
+                <a:latin typeface="Georgia"/>
+                <a:cs typeface="Georgia"/>
+              </a:rPr>
+              <a:t>links</a:t>
+            </a:r>
+            <a:r>
+              <a:rPr lang="en-US" sz="3300" dirty="0">
+                <a:latin typeface="Georgia"/>
+                <a:cs typeface="Georgia"/>
+              </a:rPr>
+              <a:t> </a:t>
+            </a:r>
+            <a:r>
+              <a:rPr sz="3300" spc="-5" dirty="0">
+                <a:solidFill>
+                  <a:srgbClr val="5F5F5F"/>
+                </a:solidFill>
+                <a:latin typeface="Georgia"/>
+                <a:cs typeface="Georgia"/>
+              </a:rPr>
+              <a:t>will be posted here</a:t>
+            </a:r>
+            <a:endParaRPr sz="3300" dirty="0">
+              <a:latin typeface="Georgia"/>
+              <a:cs typeface="Georgia"/>
+            </a:endParaRPr>
+          </a:p>
+        </p:txBody>
+      </p:sp>
+      <p:sp>
+        <p:nvSpPr>
+          <p:cNvPr id="4" name="object 4"/>
+          <p:cNvSpPr txBox="1">
+            <a:spLocks noGrp="1"/>
+          </p:cNvSpPr>
+          <p:nvPr>
+            <p:ph type="title"/>
+          </p:nvPr>
+        </p:nvSpPr>
+        <p:spPr>
+          <a:xfrm>
+            <a:off x="5118100" y="533400"/>
+            <a:ext cx="3019425" cy="769441"/>
+          </a:xfrm>
+          <a:prstGeom prst="rect">
+            <a:avLst/>
+          </a:prstGeom>
+        </p:spPr>
+        <p:txBody>
+          <a:bodyPr vert="horz" wrap="square" lIns="0" tIns="0" rIns="0" bIns="0" rtlCol="0">
+            <a:spAutoFit/>
+          </a:bodyPr>
+          <a:lstStyle/>
+          <a:p>
+            <a:pPr marL="12700">
+              <a:lnSpc>
+                <a:spcPts val="5995"/>
+              </a:lnSpc>
+            </a:pPr>
+            <a:r>
+              <a:rPr sz="5000" dirty="0"/>
+              <a:t>ODDS </a:t>
+            </a:r>
+            <a:r>
+              <a:rPr lang="en-US" sz="5000" dirty="0"/>
+              <a:t>&amp; </a:t>
+            </a:r>
+            <a:r>
+              <a:rPr sz="5000" dirty="0"/>
+              <a:t>ENDS</a:t>
+            </a:r>
+          </a:p>
+        </p:txBody>
+      </p:sp>
+      <p:sp>
+        <p:nvSpPr>
+          <p:cNvPr id="5" name="object 5"/>
+          <p:cNvSpPr/>
+          <p:nvPr/>
+        </p:nvSpPr>
+        <p:spPr>
+          <a:xfrm>
+            <a:off x="4165600" y="558800"/>
+            <a:ext cx="736600" cy="781316"/>
+          </a:xfrm>
+          <a:prstGeom prst="rect">
+            <a:avLst/>
+          </a:prstGeom>
+          <a:blipFill>
+            <a:blip r:embed="rId2" cstate="print"/>
+            <a:stretch>
+              <a:fillRect/>
+            </a:stretch>
+          </a:blipFill>
+        </p:spPr>
+        <p:txBody>
+          <a:bodyPr wrap="square" lIns="0" tIns="0" rIns="0" bIns="0" rtlCol="0"/>
+          <a:lstStyle/>
+          <a:p>
+            <a:endParaRPr/>
+          </a:p>
+        </p:txBody>
+      </p:sp>
+      <p:sp>
+        <p:nvSpPr>
+          <p:cNvPr id="6" name="object 6"/>
+          <p:cNvSpPr txBox="1"/>
+          <p:nvPr/>
+        </p:nvSpPr>
+        <p:spPr>
+          <a:xfrm>
+            <a:off x="1846618" y="3352800"/>
+            <a:ext cx="9227782" cy="923330"/>
+          </a:xfrm>
+          <a:prstGeom prst="rect">
+            <a:avLst/>
+          </a:prstGeom>
+        </p:spPr>
+        <p:txBody>
+          <a:bodyPr vert="horz" wrap="square" lIns="0" tIns="0" rIns="0" bIns="0" rtlCol="0">
+            <a:spAutoFit/>
+          </a:bodyPr>
+          <a:lstStyle/>
+          <a:p>
+            <a:pPr marL="12700">
+              <a:lnSpc>
+                <a:spcPct val="100000"/>
+              </a:lnSpc>
+            </a:pPr>
+            <a:r>
+              <a:rPr sz="6000" spc="-5" dirty="0">
+                <a:solidFill>
+                  <a:srgbClr val="5F5F5F"/>
+                </a:solidFill>
+                <a:latin typeface="Georgia"/>
+                <a:cs typeface="Georgia"/>
+                <a:hlinkClick r:id="rId3"/>
+              </a:rPr>
+              <a:t>kweeket.github.</a:t>
+            </a:r>
+            <a:r>
+              <a:rPr lang="en-US" sz="6000" spc="-5" dirty="0">
+                <a:solidFill>
+                  <a:srgbClr val="5F5F5F"/>
+                </a:solidFill>
+                <a:latin typeface="Georgia"/>
+                <a:cs typeface="Georgia"/>
+                <a:hlinkClick r:id="rId3"/>
+              </a:rPr>
+              <a:t>io/dev-101</a:t>
+            </a:r>
+            <a:endParaRPr sz="6000" dirty="0">
+              <a:latin typeface="Georgia"/>
+              <a:cs typeface="Georgia"/>
+            </a:endParaRPr>
+          </a:p>
+        </p:txBody>
+      </p:sp>
+    </p:spTree>
+  </p:cSld>
+  <p:clrMapOvr>
+    <a:masterClrMapping/>
+  </p:clrMapOvr>
+  <p:timing>
+    <p:tnLst>
+      <p:par>
+        <p:cTn id="1" dur="indefinite" restart="never" nodeType="tmRoot"/>
+      </p:par>
+    </p:tnLst>
+  </p:timing>
+</p:sld>
+</file>
+
+<file path=ppt/slides/slide60.xml><?xml version="1.0" encoding="utf-8"?>
 <p:sld xmlns:a="http://schemas.openxmlformats.org/drawingml/2006/main" xmlns:r="http://schemas.openxmlformats.org/officeDocument/2006/relationships" xmlns:p="http://schemas.openxmlformats.org/presentationml/2006/main">
   <p:cSld>
     <p:spTree>
@@ -29401,395 +31598,7 @@
 </p:sld>
 </file>
 
-<file path=ppt/slides/slide6.xml><?xml version="1.0" encoding="utf-8"?>
-<p:sld xmlns:a="http://schemas.openxmlformats.org/drawingml/2006/main" xmlns:r="http://schemas.openxmlformats.org/officeDocument/2006/relationships" xmlns:p="http://schemas.openxmlformats.org/presentationml/2006/main" showMasterSp="0">
-  <p:cSld>
-    <p:spTree>
-      <p:nvGrpSpPr>
-        <p:cNvPr id="1" name=""/>
-        <p:cNvGrpSpPr/>
-        <p:nvPr/>
-      </p:nvGrpSpPr>
-      <p:grpSpPr>
-        <a:xfrm>
-          <a:off x="0" y="0"/>
-          <a:ext cx="0" cy="0"/>
-          <a:chOff x="0" y="0"/>
-          <a:chExt cx="0" cy="0"/>
-        </a:xfrm>
-      </p:grpSpPr>
-      <p:sp>
-        <p:nvSpPr>
-          <p:cNvPr id="8" name="object 2"/>
-          <p:cNvSpPr/>
-          <p:nvPr/>
-        </p:nvSpPr>
-        <p:spPr>
-          <a:xfrm>
-            <a:off x="0" y="0"/>
-            <a:ext cx="13004800" cy="1796544"/>
-          </a:xfrm>
-          <a:custGeom>
-            <a:avLst/>
-            <a:gdLst/>
-            <a:ahLst/>
-            <a:cxnLst/>
-            <a:rect l="l" t="t" r="r" b="b"/>
-            <a:pathLst>
-              <a:path w="13004800" h="2623820">
-                <a:moveTo>
-                  <a:pt x="0" y="2623807"/>
-                </a:moveTo>
-                <a:lnTo>
-                  <a:pt x="0" y="0"/>
-                </a:lnTo>
-                <a:lnTo>
-                  <a:pt x="13004800" y="0"/>
-                </a:lnTo>
-                <a:lnTo>
-                  <a:pt x="13004800" y="2623807"/>
-                </a:lnTo>
-                <a:lnTo>
-                  <a:pt x="0" y="2623807"/>
-                </a:lnTo>
-                <a:close/>
-              </a:path>
-            </a:pathLst>
-          </a:custGeom>
-          <a:solidFill>
-            <a:srgbClr val="209078"/>
-          </a:solidFill>
-        </p:spPr>
-        <p:txBody>
-          <a:bodyPr wrap="square" lIns="0" tIns="0" rIns="0" bIns="0" rtlCol="0"/>
-          <a:lstStyle/>
-          <a:p>
-            <a:endParaRPr/>
-          </a:p>
-        </p:txBody>
-      </p:sp>
-      <p:sp>
-        <p:nvSpPr>
-          <p:cNvPr id="2" name="object 2"/>
-          <p:cNvSpPr/>
-          <p:nvPr/>
-        </p:nvSpPr>
-        <p:spPr>
-          <a:xfrm>
-            <a:off x="0" y="-76200"/>
-            <a:ext cx="13004800" cy="1872744"/>
-          </a:xfrm>
-          <a:custGeom>
-            <a:avLst/>
-            <a:gdLst/>
-            <a:ahLst/>
-            <a:cxnLst/>
-            <a:rect l="l" t="t" r="r" b="b"/>
-            <a:pathLst>
-              <a:path w="13004800" h="2623820">
-                <a:moveTo>
-                  <a:pt x="0" y="2623807"/>
-                </a:moveTo>
-                <a:lnTo>
-                  <a:pt x="0" y="0"/>
-                </a:lnTo>
-                <a:lnTo>
-                  <a:pt x="13004800" y="0"/>
-                </a:lnTo>
-                <a:lnTo>
-                  <a:pt x="13004800" y="2623807"/>
-                </a:lnTo>
-                <a:lnTo>
-                  <a:pt x="0" y="2623807"/>
-                </a:lnTo>
-                <a:close/>
-              </a:path>
-            </a:pathLst>
-          </a:custGeom>
-          <a:solidFill>
-            <a:srgbClr val="CB3D31"/>
-          </a:solidFill>
-        </p:spPr>
-        <p:txBody>
-          <a:bodyPr wrap="square" lIns="0" tIns="0" rIns="0" bIns="0" rtlCol="0"/>
-          <a:lstStyle/>
-          <a:p>
-            <a:endParaRPr/>
-          </a:p>
-        </p:txBody>
-      </p:sp>
-      <p:sp>
-        <p:nvSpPr>
-          <p:cNvPr id="3" name="object 3"/>
-          <p:cNvSpPr txBox="1"/>
-          <p:nvPr/>
-        </p:nvSpPr>
-        <p:spPr>
-          <a:xfrm>
-            <a:off x="2002027" y="5047386"/>
-            <a:ext cx="7886700" cy="1026794"/>
-          </a:xfrm>
-          <a:prstGeom prst="rect">
-            <a:avLst/>
-          </a:prstGeom>
-        </p:spPr>
-        <p:txBody>
-          <a:bodyPr vert="horz" wrap="square" lIns="0" tIns="0" rIns="0" bIns="0" rtlCol="0">
-            <a:spAutoFit/>
-          </a:bodyPr>
-          <a:lstStyle/>
-          <a:p>
-            <a:pPr marL="12700">
-              <a:lnSpc>
-                <a:spcPct val="100000"/>
-              </a:lnSpc>
-              <a:tabLst>
-                <a:tab pos="570865" algn="l"/>
-                <a:tab pos="571500" algn="l"/>
-              </a:tabLst>
-            </a:pPr>
-            <a:r>
-              <a:rPr sz="3300" spc="-5" dirty="0">
-                <a:solidFill>
-                  <a:srgbClr val="5F5F5F"/>
-                </a:solidFill>
-                <a:latin typeface="Georgia"/>
-                <a:cs typeface="Georgia"/>
-              </a:rPr>
-              <a:t>Slides, </a:t>
-            </a:r>
-            <a:r>
-              <a:rPr lang="en-US" sz="3300" spc="-5" dirty="0">
-                <a:solidFill>
-                  <a:srgbClr val="5F5F5F"/>
-                </a:solidFill>
-                <a:latin typeface="Georgia"/>
-                <a:cs typeface="Georgia"/>
-              </a:rPr>
-              <a:t>sample files, “</a:t>
-            </a:r>
-            <a:r>
-              <a:rPr sz="3300" dirty="0">
-                <a:solidFill>
-                  <a:srgbClr val="5F5F5F"/>
-                </a:solidFill>
-                <a:latin typeface="Georgia"/>
-                <a:cs typeface="Georgia"/>
-              </a:rPr>
-              <a:t>homework</a:t>
-            </a:r>
-            <a:r>
-              <a:rPr lang="en-US" sz="3300" dirty="0">
-                <a:solidFill>
-                  <a:srgbClr val="5F5F5F"/>
-                </a:solidFill>
-                <a:latin typeface="Georgia"/>
-                <a:cs typeface="Georgia"/>
-              </a:rPr>
-              <a:t>"</a:t>
-            </a:r>
-            <a:r>
-              <a:rPr sz="3300" dirty="0">
-                <a:solidFill>
-                  <a:srgbClr val="5F5F5F"/>
-                </a:solidFill>
-                <a:latin typeface="Georgia"/>
-                <a:cs typeface="Georgia"/>
-              </a:rPr>
-              <a:t>, and </a:t>
-            </a:r>
-            <a:r>
-              <a:rPr sz="3300" spc="-5" dirty="0">
-                <a:solidFill>
-                  <a:srgbClr val="5F5F5F"/>
-                </a:solidFill>
-                <a:latin typeface="Georgia"/>
-                <a:cs typeface="Georgia"/>
-              </a:rPr>
-              <a:t>interesting</a:t>
-            </a:r>
-            <a:r>
-              <a:rPr sz="3300" spc="-30" dirty="0">
-                <a:solidFill>
-                  <a:srgbClr val="5F5F5F"/>
-                </a:solidFill>
-                <a:latin typeface="Georgia"/>
-                <a:cs typeface="Georgia"/>
-              </a:rPr>
-              <a:t> </a:t>
-            </a:r>
-            <a:r>
-              <a:rPr sz="3300" dirty="0">
-                <a:solidFill>
-                  <a:srgbClr val="5F5F5F"/>
-                </a:solidFill>
-                <a:latin typeface="Georgia"/>
-                <a:cs typeface="Georgia"/>
-              </a:rPr>
-              <a:t>links</a:t>
-            </a:r>
-            <a:r>
-              <a:rPr lang="en-US" sz="3300" dirty="0">
-                <a:latin typeface="Georgia"/>
-                <a:cs typeface="Georgia"/>
-              </a:rPr>
-              <a:t> </a:t>
-            </a:r>
-            <a:r>
-              <a:rPr sz="3300" spc="-5" dirty="0">
-                <a:solidFill>
-                  <a:srgbClr val="5F5F5F"/>
-                </a:solidFill>
-                <a:latin typeface="Georgia"/>
-                <a:cs typeface="Georgia"/>
-              </a:rPr>
-              <a:t>will be posted here</a:t>
-            </a:r>
-            <a:endParaRPr sz="3300" dirty="0">
-              <a:latin typeface="Georgia"/>
-              <a:cs typeface="Georgia"/>
-            </a:endParaRPr>
-          </a:p>
-        </p:txBody>
-      </p:sp>
-      <p:sp>
-        <p:nvSpPr>
-          <p:cNvPr id="4" name="object 4"/>
-          <p:cNvSpPr txBox="1">
-            <a:spLocks noGrp="1"/>
-          </p:cNvSpPr>
-          <p:nvPr>
-            <p:ph type="title"/>
-          </p:nvPr>
-        </p:nvSpPr>
-        <p:spPr>
-          <a:xfrm>
-            <a:off x="5118100" y="533400"/>
-            <a:ext cx="3019425" cy="769441"/>
-          </a:xfrm>
-          <a:prstGeom prst="rect">
-            <a:avLst/>
-          </a:prstGeom>
-        </p:spPr>
-        <p:txBody>
-          <a:bodyPr vert="horz" wrap="square" lIns="0" tIns="0" rIns="0" bIns="0" rtlCol="0">
-            <a:spAutoFit/>
-          </a:bodyPr>
-          <a:lstStyle/>
-          <a:p>
-            <a:pPr marL="12700">
-              <a:lnSpc>
-                <a:spcPts val="5995"/>
-              </a:lnSpc>
-            </a:pPr>
-            <a:r>
-              <a:rPr sz="5000" dirty="0"/>
-              <a:t>ODDS </a:t>
-            </a:r>
-            <a:r>
-              <a:rPr lang="en-US" sz="5000" dirty="0"/>
-              <a:t>&amp; </a:t>
-            </a:r>
-            <a:r>
-              <a:rPr sz="5000" dirty="0"/>
-              <a:t>ENDS</a:t>
-            </a:r>
-          </a:p>
-        </p:txBody>
-      </p:sp>
-      <p:sp>
-        <p:nvSpPr>
-          <p:cNvPr id="5" name="object 5"/>
-          <p:cNvSpPr/>
-          <p:nvPr/>
-        </p:nvSpPr>
-        <p:spPr>
-          <a:xfrm>
-            <a:off x="4165600" y="558800"/>
-            <a:ext cx="736600" cy="781316"/>
-          </a:xfrm>
-          <a:prstGeom prst="rect">
-            <a:avLst/>
-          </a:prstGeom>
-          <a:blipFill>
-            <a:blip r:embed="rId2" cstate="print"/>
-            <a:stretch>
-              <a:fillRect/>
-            </a:stretch>
-          </a:blipFill>
-        </p:spPr>
-        <p:txBody>
-          <a:bodyPr wrap="square" lIns="0" tIns="0" rIns="0" bIns="0" rtlCol="0"/>
-          <a:lstStyle/>
-          <a:p>
-            <a:endParaRPr/>
-          </a:p>
-        </p:txBody>
-      </p:sp>
-      <p:sp>
-        <p:nvSpPr>
-          <p:cNvPr id="6" name="object 6"/>
-          <p:cNvSpPr txBox="1"/>
-          <p:nvPr/>
-        </p:nvSpPr>
-        <p:spPr>
-          <a:xfrm>
-            <a:off x="1846618" y="3352800"/>
-            <a:ext cx="9227782" cy="923330"/>
-          </a:xfrm>
-          <a:prstGeom prst="rect">
-            <a:avLst/>
-          </a:prstGeom>
-        </p:spPr>
-        <p:txBody>
-          <a:bodyPr vert="horz" wrap="square" lIns="0" tIns="0" rIns="0" bIns="0" rtlCol="0">
-            <a:spAutoFit/>
-          </a:bodyPr>
-          <a:lstStyle/>
-          <a:p>
-            <a:pPr marL="12700">
-              <a:lnSpc>
-                <a:spcPct val="100000"/>
-              </a:lnSpc>
-            </a:pPr>
-            <a:r>
-              <a:rPr sz="6000" spc="-5" dirty="0">
-                <a:solidFill>
-                  <a:srgbClr val="5F5F5F"/>
-                </a:solidFill>
-                <a:latin typeface="Georgia"/>
-                <a:cs typeface="Georgia"/>
-                <a:hlinkClick r:id="rId3"/>
-              </a:rPr>
-              <a:t>kweeket.github.</a:t>
-            </a:r>
-            <a:r>
-              <a:rPr lang="en-US" sz="6000" spc="-5" dirty="0">
-                <a:solidFill>
-                  <a:srgbClr val="5F5F5F"/>
-                </a:solidFill>
-                <a:latin typeface="Georgia"/>
-                <a:cs typeface="Georgia"/>
-                <a:hlinkClick r:id="rId3"/>
-              </a:rPr>
-              <a:t>io/dev-101</a:t>
-            </a:r>
-            <a:endParaRPr sz="6000" dirty="0">
-              <a:latin typeface="Georgia"/>
-              <a:cs typeface="Georgia"/>
-            </a:endParaRPr>
-          </a:p>
-        </p:txBody>
-      </p:sp>
-    </p:spTree>
-  </p:cSld>
-  <p:clrMapOvr>
-    <a:masterClrMapping/>
-  </p:clrMapOvr>
-</p:sld>
-</file>
-
-<file path=ppt/slides/slide60.xml><?xml version="1.0" encoding="utf-8"?>
+<file path=ppt/slides/slide61.xml><?xml version="1.0" encoding="utf-8"?>
 <p:sld xmlns:a="http://schemas.openxmlformats.org/drawingml/2006/main" xmlns:r="http://schemas.openxmlformats.org/officeDocument/2006/relationships" xmlns:p="http://schemas.openxmlformats.org/presentationml/2006/main">
   <p:cSld>
     <p:spTree>
@@ -30193,7 +32002,7 @@
 </p:sld>
 </file>
 
-<file path=ppt/slides/slide61.xml><?xml version="1.0" encoding="utf-8"?>
+<file path=ppt/slides/slide62.xml><?xml version="1.0" encoding="utf-8"?>
 <p:sld xmlns:a="http://schemas.openxmlformats.org/drawingml/2006/main" xmlns:r="http://schemas.openxmlformats.org/officeDocument/2006/relationships" xmlns:p="http://schemas.openxmlformats.org/presentationml/2006/main">
   <p:cSld>
     <p:spTree>
@@ -30454,7 +32263,7 @@
 </p:sld>
 </file>
 
-<file path=ppt/slides/slide62.xml><?xml version="1.0" encoding="utf-8"?>
+<file path=ppt/slides/slide63.xml><?xml version="1.0" encoding="utf-8"?>
 <p:sld xmlns:a="http://schemas.openxmlformats.org/drawingml/2006/main" xmlns:r="http://schemas.openxmlformats.org/officeDocument/2006/relationships" xmlns:p="http://schemas.openxmlformats.org/presentationml/2006/main">
   <p:cSld>
     <p:spTree>
@@ -31067,6 +32876,13 @@
   <p:clrMapOvr>
     <a:masterClrMapping/>
   </p:clrMapOvr>
+  <p:timing>
+    <p:tnLst>
+      <p:par>
+        <p:cTn id="1" dur="indefinite" restart="never" nodeType="tmRoot"/>
+      </p:par>
+    </p:tnLst>
+  </p:timing>
 </p:sld>
 </file>
 
@@ -33228,6 +35044,13 @@
   <p:clrMapOvr>
     <a:masterClrMapping/>
   </p:clrMapOvr>
+  <p:timing>
+    <p:tnLst>
+      <p:par>
+        <p:cTn id="1" dur="indefinite" restart="never" nodeType="tmRoot"/>
+      </p:par>
+    </p:tnLst>
+  </p:timing>
 </p:sld>
 </file>
 
@@ -34284,6 +36107,13 @@
   <p:clrMapOvr>
     <a:masterClrMapping/>
   </p:clrMapOvr>
+  <p:timing>
+    <p:tnLst>
+      <p:par>
+        <p:cTn id="1" dur="indefinite" restart="never" nodeType="tmRoot"/>
+      </p:par>
+    </p:tnLst>
+  </p:timing>
 </p:sld>
 </file>
 

</xml_diff>

<commit_message>
change tag to element in a couple places
</commit_message>
<xml_diff>
--- a/slides/week-1.pptx
+++ b/slides/week-1.pptx
@@ -6798,7 +6798,7 @@
           <p:cNvPr id="6" name="Picture 5">
             <a:extLst>
               <a:ext uri="{FF2B5EF4-FFF2-40B4-BE49-F238E27FC236}">
-                <a16:creationId xmlns:a16="http://schemas.microsoft.com/office/drawing/2014/main" xmlns="" id="{B6C967B6-C6ED-4392-892C-1985F84EDA2C}"/>
+                <a16:creationId xmlns="" xmlns:a16="http://schemas.microsoft.com/office/drawing/2014/main" id="{B6C967B6-C6ED-4392-892C-1985F84EDA2C}"/>
               </a:ext>
             </a:extLst>
           </p:cNvPr>
@@ -8960,27 +8960,17 @@
               <a:t> HTML </a:t>
             </a:r>
             <a:r>
-              <a:rPr sz="3300" spc="-5" dirty="0">
-                <a:solidFill>
-                  <a:srgbClr val="5F5F5F"/>
-                </a:solidFill>
-                <a:latin typeface="Georgia"/>
-                <a:cs typeface="Georgia"/>
-              </a:rPr>
-              <a:t>tag</a:t>
-            </a:r>
-            <a:r>
-              <a:rPr lang="en-US" sz="3300" spc="-5" dirty="0">
-                <a:solidFill>
-                  <a:srgbClr val="5F5F5F"/>
-                </a:solidFill>
-                <a:latin typeface="Georgia"/>
-                <a:cs typeface="Georgia"/>
-              </a:rPr>
-              <a:t>s</a:t>
-            </a:r>
-            <a:r>
-              <a:rPr sz="3300" spc="-5" dirty="0">
+              <a:rPr lang="en-US" sz="3300" spc="-5" dirty="0" smtClean="0">
+                <a:solidFill>
+                  <a:srgbClr val="5F5F5F"/>
+                </a:solidFill>
+                <a:latin typeface="Georgia"/>
+                <a:cs typeface="Georgia"/>
+              </a:rPr>
+              <a:t>elements</a:t>
+            </a:r>
+            <a:r>
+              <a:rPr sz="3300" spc="-5" dirty="0" smtClean="0">
                 <a:solidFill>
                   <a:srgbClr val="5F5F5F"/>
                 </a:solidFill>
@@ -9214,10 +9204,30 @@
                 <a:latin typeface="Georgia"/>
                 <a:cs typeface="Georgia"/>
               </a:rPr>
-              <a:t>types of tags</a:t>
-            </a:r>
-            <a:r>
-              <a:rPr sz="3300" spc="-5" dirty="0">
+              <a:t>types of </a:t>
+            </a:r>
+            <a:r>
+              <a:rPr lang="en-US" sz="3300" spc="-5" dirty="0" smtClean="0">
+                <a:solidFill>
+                  <a:srgbClr val="5F5F5F"/>
+                </a:solidFill>
+                <a:latin typeface="Georgia"/>
+                <a:cs typeface="Georgia"/>
+              </a:rPr>
+              <a:t>element</a:t>
+            </a:r>
+            <a:r>
+              <a:rPr lang="en-US" sz="3300" spc="-5" dirty="0" smtClean="0">
+                <a:solidFill>
+                  <a:srgbClr val="5F5F5F"/>
+                </a:solidFill>
+                <a:latin typeface="Georgia"/>
+                <a:cs typeface="Georgia"/>
+              </a:rPr>
+              <a:t>s</a:t>
+            </a:r>
+            <a:r>
+              <a:rPr sz="3300" spc="-5" dirty="0" smtClean="0">
                 <a:solidFill>
                   <a:srgbClr val="5F5F5F"/>
                 </a:solidFill>
@@ -13232,7 +13242,27 @@
                 <a:latin typeface="Georgia"/>
                 <a:cs typeface="Georgia"/>
               </a:rPr>
-              <a:t>Five sessions over a six-week period</a:t>
+              <a:t>Five sessions over a </a:t>
+            </a:r>
+            <a:r>
+              <a:rPr lang="en-US" sz="3300" dirty="0" smtClean="0">
+                <a:solidFill>
+                  <a:srgbClr val="5F5F5F"/>
+                </a:solidFill>
+                <a:latin typeface="Georgia"/>
+                <a:cs typeface="Georgia"/>
+              </a:rPr>
+              <a:t>five-week </a:t>
+            </a:r>
+            <a:r>
+              <a:rPr lang="en-US" sz="3300" dirty="0">
+                <a:solidFill>
+                  <a:srgbClr val="5F5F5F"/>
+                </a:solidFill>
+                <a:latin typeface="Georgia"/>
+                <a:cs typeface="Georgia"/>
+              </a:rPr>
+              <a:t>period</a:t>
             </a:r>
           </a:p>
           <a:p>
@@ -18803,7 +18833,7 @@
           <p:cNvPr id="8" name="Rectangle 7">
             <a:extLst>
               <a:ext uri="{FF2B5EF4-FFF2-40B4-BE49-F238E27FC236}">
-                <a16:creationId xmlns:a16="http://schemas.microsoft.com/office/drawing/2014/main" xmlns="" id="{2801331B-CE52-4F2B-BBBA-46C8F1D11A28}"/>
+                <a16:creationId xmlns="" xmlns:a16="http://schemas.microsoft.com/office/drawing/2014/main" id="{2801331B-CE52-4F2B-BBBA-46C8F1D11A28}"/>
               </a:ext>
             </a:extLst>
           </p:cNvPr>
@@ -30448,7 +30478,7 @@
           <p:cNvPr id="8" name="Picture 7">
             <a:extLst>
               <a:ext uri="{FF2B5EF4-FFF2-40B4-BE49-F238E27FC236}">
-                <a16:creationId xmlns:a16="http://schemas.microsoft.com/office/drawing/2014/main" xmlns="" id="{C7C9DAFA-0C6A-43A5-B549-F67B33448717}"/>
+                <a16:creationId xmlns="" xmlns:a16="http://schemas.microsoft.com/office/drawing/2014/main" id="{C7C9DAFA-0C6A-43A5-B549-F67B33448717}"/>
               </a:ext>
             </a:extLst>
           </p:cNvPr>
@@ -30478,7 +30508,7 @@
           <p:cNvPr id="9" name="Rectangle 8">
             <a:extLst>
               <a:ext uri="{FF2B5EF4-FFF2-40B4-BE49-F238E27FC236}">
-                <a16:creationId xmlns:a16="http://schemas.microsoft.com/office/drawing/2014/main" xmlns="" id="{6AC2F42D-4351-4B04-9653-16B5E5275A9C}"/>
+                <a16:creationId xmlns="" xmlns:a16="http://schemas.microsoft.com/office/drawing/2014/main" id="{6AC2F42D-4351-4B04-9653-16B5E5275A9C}"/>
               </a:ext>
             </a:extLst>
           </p:cNvPr>
@@ -30529,7 +30559,7 @@
           <p:cNvPr id="10" name="Rectangle 9">
             <a:extLst>
               <a:ext uri="{FF2B5EF4-FFF2-40B4-BE49-F238E27FC236}">
-                <a16:creationId xmlns:a16="http://schemas.microsoft.com/office/drawing/2014/main" xmlns="" id="{A25735EF-2D89-4819-A53B-790AC14DCE7A}"/>
+                <a16:creationId xmlns="" xmlns:a16="http://schemas.microsoft.com/office/drawing/2014/main" id="{A25735EF-2D89-4819-A53B-790AC14DCE7A}"/>
               </a:ext>
             </a:extLst>
           </p:cNvPr>
@@ -30842,7 +30872,7 @@
           <p:cNvPr id="5" name="Picture 4">
             <a:extLst>
               <a:ext uri="{FF2B5EF4-FFF2-40B4-BE49-F238E27FC236}">
-                <a16:creationId xmlns:a16="http://schemas.microsoft.com/office/drawing/2014/main" xmlns="" id="{566F5C96-B47B-4D64-8817-2344BC01C95B}"/>
+                <a16:creationId xmlns="" xmlns:a16="http://schemas.microsoft.com/office/drawing/2014/main" id="{566F5C96-B47B-4D64-8817-2344BC01C95B}"/>
               </a:ext>
             </a:extLst>
           </p:cNvPr>
@@ -30872,7 +30902,7 @@
           <p:cNvPr id="6" name="Rectangle 5">
             <a:extLst>
               <a:ext uri="{FF2B5EF4-FFF2-40B4-BE49-F238E27FC236}">
-                <a16:creationId xmlns:a16="http://schemas.microsoft.com/office/drawing/2014/main" xmlns="" id="{2A0AF151-C463-45FF-9E0C-C46B12438D6B}"/>
+                <a16:creationId xmlns="" xmlns:a16="http://schemas.microsoft.com/office/drawing/2014/main" id="{2A0AF151-C463-45FF-9E0C-C46B12438D6B}"/>
               </a:ext>
             </a:extLst>
           </p:cNvPr>
@@ -31509,7 +31539,7 @@
           <p:cNvPr id="5" name="Picture 4">
             <a:extLst>
               <a:ext uri="{FF2B5EF4-FFF2-40B4-BE49-F238E27FC236}">
-                <a16:creationId xmlns:a16="http://schemas.microsoft.com/office/drawing/2014/main" xmlns="" id="{566F5C96-B47B-4D64-8817-2344BC01C95B}"/>
+                <a16:creationId xmlns="" xmlns:a16="http://schemas.microsoft.com/office/drawing/2014/main" id="{566F5C96-B47B-4D64-8817-2344BC01C95B}"/>
               </a:ext>
             </a:extLst>
           </p:cNvPr>
@@ -31539,7 +31569,7 @@
           <p:cNvPr id="6" name="Rectangle 5">
             <a:extLst>
               <a:ext uri="{FF2B5EF4-FFF2-40B4-BE49-F238E27FC236}">
-                <a16:creationId xmlns:a16="http://schemas.microsoft.com/office/drawing/2014/main" xmlns="" id="{2A0AF151-C463-45FF-9E0C-C46B12438D6B}"/>
+                <a16:creationId xmlns="" xmlns:a16="http://schemas.microsoft.com/office/drawing/2014/main" id="{2A0AF151-C463-45FF-9E0C-C46B12438D6B}"/>
               </a:ext>
             </a:extLst>
           </p:cNvPr>
@@ -31598,7 +31628,7 @@
           <p:cNvPr id="7" name="Picture 6">
             <a:extLst>
               <a:ext uri="{FF2B5EF4-FFF2-40B4-BE49-F238E27FC236}">
-                <a16:creationId xmlns:a16="http://schemas.microsoft.com/office/drawing/2014/main" xmlns="" id="{C264C0D2-6000-4B85-96A0-033396BC535F}"/>
+                <a16:creationId xmlns="" xmlns:a16="http://schemas.microsoft.com/office/drawing/2014/main" id="{C264C0D2-6000-4B85-96A0-033396BC535F}"/>
               </a:ext>
             </a:extLst>
           </p:cNvPr>
@@ -31793,7 +31823,7 @@
           <p:cNvPr id="6" name="Rectangle 5">
             <a:extLst>
               <a:ext uri="{FF2B5EF4-FFF2-40B4-BE49-F238E27FC236}">
-                <a16:creationId xmlns:a16="http://schemas.microsoft.com/office/drawing/2014/main" xmlns="" id="{2A0AF151-C463-45FF-9E0C-C46B12438D6B}"/>
+                <a16:creationId xmlns="" xmlns:a16="http://schemas.microsoft.com/office/drawing/2014/main" id="{2A0AF151-C463-45FF-9E0C-C46B12438D6B}"/>
               </a:ext>
             </a:extLst>
           </p:cNvPr>
@@ -31906,7 +31936,7 @@
           <p:cNvPr id="13" name="Group 12">
             <a:extLst>
               <a:ext uri="{FF2B5EF4-FFF2-40B4-BE49-F238E27FC236}">
-                <a16:creationId xmlns:a16="http://schemas.microsoft.com/office/drawing/2014/main" xmlns="" id="{9BEF821C-6B18-489C-8DD6-6B107BDE3358}"/>
+                <a16:creationId xmlns="" xmlns:a16="http://schemas.microsoft.com/office/drawing/2014/main" id="{9BEF821C-6B18-489C-8DD6-6B107BDE3358}"/>
               </a:ext>
             </a:extLst>
           </p:cNvPr>
@@ -31926,7 +31956,7 @@
             <p:cNvPr id="11" name="Picture 2" descr="laptop_PNG8915.png (2046×1681)">
               <a:extLst>
                 <a:ext uri="{FF2B5EF4-FFF2-40B4-BE49-F238E27FC236}">
-                  <a16:creationId xmlns:a16="http://schemas.microsoft.com/office/drawing/2014/main" xmlns="" id="{533D1EA0-D356-465B-B013-BE5185288069}"/>
+                  <a16:creationId xmlns="" xmlns:a16="http://schemas.microsoft.com/office/drawing/2014/main" id="{533D1EA0-D356-465B-B013-BE5185288069}"/>
                 </a:ext>
               </a:extLst>
             </p:cNvPr>
@@ -31973,7 +32003,7 @@
             <p:cNvPr id="7" name="Picture 6">
               <a:extLst>
                 <a:ext uri="{FF2B5EF4-FFF2-40B4-BE49-F238E27FC236}">
-                  <a16:creationId xmlns:a16="http://schemas.microsoft.com/office/drawing/2014/main" xmlns="" id="{C264C0D2-6000-4B85-96A0-033396BC535F}"/>
+                  <a16:creationId xmlns="" xmlns:a16="http://schemas.microsoft.com/office/drawing/2014/main" id="{C264C0D2-6000-4B85-96A0-033396BC535F}"/>
                 </a:ext>
               </a:extLst>
             </p:cNvPr>
@@ -32003,7 +32033,7 @@
           <p:cNvPr id="14" name="Picture 13">
             <a:extLst>
               <a:ext uri="{FF2B5EF4-FFF2-40B4-BE49-F238E27FC236}">
-                <a16:creationId xmlns:a16="http://schemas.microsoft.com/office/drawing/2014/main" xmlns="" id="{97AD0940-8B59-4009-B1ED-49D3AB6FAF06}"/>
+                <a16:creationId xmlns="" xmlns:a16="http://schemas.microsoft.com/office/drawing/2014/main" id="{97AD0940-8B59-4009-B1ED-49D3AB6FAF06}"/>
               </a:ext>
             </a:extLst>
           </p:cNvPr>

</xml_diff>